<commit_message>
added slides jiyoung part
</commit_message>
<xml_diff>
--- a/ATML_presentation.pptx
+++ b/ATML_presentation.pptx
@@ -1060,6 +1060,188 @@
 </p:notesMaster>
 </file>
 
+<file path=ppt/notesSlides/notesSlide1.xml><?xml version="1.0" encoding="utf-8"?>
+<p:notes xmlns:a="http://schemas.openxmlformats.org/drawingml/2006/main" xmlns:r="http://schemas.openxmlformats.org/officeDocument/2006/relationships" xmlns:p="http://schemas.openxmlformats.org/presentationml/2006/main">
+  <p:cSld>
+    <p:spTree>
+      <p:nvGrpSpPr>
+        <p:cNvPr id="1" name=""/>
+        <p:cNvGrpSpPr/>
+        <p:nvPr/>
+      </p:nvGrpSpPr>
+      <p:grpSpPr>
+        <a:xfrm>
+          <a:off x="0" y="0"/>
+          <a:ext cx="0" cy="0"/>
+          <a:chOff x="0" y="0"/>
+          <a:chExt cx="0" cy="0"/>
+        </a:xfrm>
+      </p:grpSpPr>
+      <p:sp>
+        <p:nvSpPr>
+          <p:cNvPr id="2" name="Slide Image Placeholder 1"/>
+          <p:cNvSpPr>
+            <a:spLocks noGrp="1" noRot="1" noChangeAspect="1"/>
+          </p:cNvSpPr>
+          <p:nvPr>
+            <p:ph type="sldImg"/>
+          </p:nvPr>
+        </p:nvSpPr>
+        <p:spPr/>
+      </p:sp>
+      <p:sp>
+        <p:nvSpPr>
+          <p:cNvPr id="3" name="Notes Placeholder 2"/>
+          <p:cNvSpPr>
+            <a:spLocks noGrp="1"/>
+          </p:cNvSpPr>
+          <p:nvPr>
+            <p:ph type="body" idx="1"/>
+          </p:nvPr>
+        </p:nvSpPr>
+        <p:spPr/>
+        <p:txBody>
+          <a:bodyPr/>
+          <a:lstStyle/>
+          <a:p>
+            <a:r>
+              <a:rPr lang="en-US" altLang="ko-KR" dirty="0"/>
+              <a:t>Our goal is to detect alphabets in American Sign Language.</a:t>
+            </a:r>
+          </a:p>
+          <a:p>
+            <a:endParaRPr lang="ko-KR" altLang="en-US" dirty="0"/>
+          </a:p>
+        </p:txBody>
+      </p:sp>
+      <p:sp>
+        <p:nvSpPr>
+          <p:cNvPr id="4" name="Slide Number Placeholder 3"/>
+          <p:cNvSpPr>
+            <a:spLocks noGrp="1"/>
+          </p:cNvSpPr>
+          <p:nvPr>
+            <p:ph type="sldNum" sz="quarter" idx="5"/>
+          </p:nvPr>
+        </p:nvSpPr>
+        <p:spPr/>
+        <p:txBody>
+          <a:bodyPr/>
+          <a:lstStyle/>
+          <a:p>
+            <a:fld id="{04A51B89-CABC-45B5-B711-980681E2ED72}" type="slidenum">
+              <a:rPr lang="de-CH" smtClean="0"/>
+              <a:pPr/>
+              <a:t>2</a:t>
+            </a:fld>
+            <a:endParaRPr lang="de-CH"/>
+          </a:p>
+        </p:txBody>
+      </p:sp>
+    </p:spTree>
+    <p:extLst>
+      <p:ext uri="{BB962C8B-B14F-4D97-AF65-F5344CB8AC3E}">
+        <p14:creationId xmlns:p14="http://schemas.microsoft.com/office/powerpoint/2010/main" val="1473682883"/>
+      </p:ext>
+    </p:extLst>
+  </p:cSld>
+  <p:clrMapOvr>
+    <a:masterClrMapping/>
+  </p:clrMapOvr>
+</p:notes>
+</file>
+
+<file path=ppt/notesSlides/notesSlide2.xml><?xml version="1.0" encoding="utf-8"?>
+<p:notes xmlns:a="http://schemas.openxmlformats.org/drawingml/2006/main" xmlns:r="http://schemas.openxmlformats.org/officeDocument/2006/relationships" xmlns:p="http://schemas.openxmlformats.org/presentationml/2006/main">
+  <p:cSld>
+    <p:spTree>
+      <p:nvGrpSpPr>
+        <p:cNvPr id="1" name=""/>
+        <p:cNvGrpSpPr/>
+        <p:nvPr/>
+      </p:nvGrpSpPr>
+      <p:grpSpPr>
+        <a:xfrm>
+          <a:off x="0" y="0"/>
+          <a:ext cx="0" cy="0"/>
+          <a:chOff x="0" y="0"/>
+          <a:chExt cx="0" cy="0"/>
+        </a:xfrm>
+      </p:grpSpPr>
+      <p:sp>
+        <p:nvSpPr>
+          <p:cNvPr id="2" name="Slide Image Placeholder 1"/>
+          <p:cNvSpPr>
+            <a:spLocks noGrp="1" noRot="1" noChangeAspect="1"/>
+          </p:cNvSpPr>
+          <p:nvPr>
+            <p:ph type="sldImg"/>
+          </p:nvPr>
+        </p:nvSpPr>
+        <p:spPr/>
+      </p:sp>
+      <p:sp>
+        <p:nvSpPr>
+          <p:cNvPr id="3" name="Notes Placeholder 2"/>
+          <p:cNvSpPr>
+            <a:spLocks noGrp="1"/>
+          </p:cNvSpPr>
+          <p:nvPr>
+            <p:ph type="body" idx="1"/>
+          </p:nvPr>
+        </p:nvSpPr>
+        <p:spPr/>
+        <p:txBody>
+          <a:bodyPr/>
+          <a:lstStyle/>
+          <a:p>
+            <a:r>
+              <a:rPr lang="en-US" altLang="ko-KR" dirty="0"/>
+              <a:t>Currently there are not many dataset that are available. </a:t>
+            </a:r>
+          </a:p>
+          <a:p>
+            <a:endParaRPr lang="ko-KR" altLang="en-US" dirty="0"/>
+          </a:p>
+        </p:txBody>
+      </p:sp>
+      <p:sp>
+        <p:nvSpPr>
+          <p:cNvPr id="4" name="Slide Number Placeholder 3"/>
+          <p:cNvSpPr>
+            <a:spLocks noGrp="1"/>
+          </p:cNvSpPr>
+          <p:nvPr>
+            <p:ph type="sldNum" sz="quarter" idx="5"/>
+          </p:nvPr>
+        </p:nvSpPr>
+        <p:spPr/>
+        <p:txBody>
+          <a:bodyPr/>
+          <a:lstStyle/>
+          <a:p>
+            <a:fld id="{04A51B89-CABC-45B5-B711-980681E2ED72}" type="slidenum">
+              <a:rPr lang="de-CH" smtClean="0"/>
+              <a:pPr/>
+              <a:t>4</a:t>
+            </a:fld>
+            <a:endParaRPr lang="de-CH"/>
+          </a:p>
+        </p:txBody>
+      </p:sp>
+    </p:spTree>
+    <p:extLst>
+      <p:ext uri="{BB962C8B-B14F-4D97-AF65-F5344CB8AC3E}">
+        <p14:creationId xmlns:p14="http://schemas.microsoft.com/office/powerpoint/2010/main" val="4120499775"/>
+      </p:ext>
+    </p:extLst>
+  </p:cSld>
+  <p:clrMapOvr>
+    <a:masterClrMapping/>
+  </p:clrMapOvr>
+</p:notes>
+</file>
+
 <file path=ppt/slideLayouts/slideLayout1.xml><?xml version="1.0" encoding="utf-8"?>
 <p:sldLayout xmlns:a="http://schemas.openxmlformats.org/drawingml/2006/main" xmlns:r="http://schemas.openxmlformats.org/officeDocument/2006/relationships" xmlns:p="http://schemas.openxmlformats.org/presentationml/2006/main" showMasterSp="0" type="title" preserve="1">
   <p:cSld name="Titelfolie">
@@ -1341,7 +1523,7 @@
             <a:fld id="{E8C82DAF-DEAF-4EA7-BE55-7E6CDD26CF99}" type="datetime4">
               <a:rPr lang="de-CH"/>
               <a:pPr/>
-              <a:t>16. Mai 2019</a:t>
+              <a:t>18. Mai 2019</a:t>
             </a:fld>
             <a:endParaRPr lang="de-CH"/>
           </a:p>
@@ -1574,7 +1756,7 @@
             <a:fld id="{E2714782-A64D-405C-BA5A-445680FA327E}" type="datetime4">
               <a:rPr lang="de-CH"/>
               <a:pPr/>
-              <a:t>16. Mai 2019</a:t>
+              <a:t>18. Mai 2019</a:t>
             </a:fld>
             <a:endParaRPr lang="de-CH">
               <a:solidFill>
@@ -1775,7 +1957,7 @@
             <a:fld id="{40BC2B19-3086-4B40-BD00-D6229B6DD532}" type="datetime4">
               <a:rPr lang="de-CH"/>
               <a:pPr/>
-              <a:t>16. Mai 2019</a:t>
+              <a:t>18. Mai 2019</a:t>
             </a:fld>
             <a:endParaRPr lang="de-CH">
               <a:solidFill>
@@ -1966,7 +2148,7 @@
             <a:fld id="{23AE0199-44D3-47D6-B4EF-C96D573ED5FB}" type="datetime4">
               <a:rPr lang="de-CH"/>
               <a:pPr/>
-              <a:t>16. Mai 2019</a:t>
+              <a:t>18. Mai 2019</a:t>
             </a:fld>
             <a:endParaRPr lang="de-CH">
               <a:solidFill>
@@ -2179,7 +2361,7 @@
             <a:fld id="{F96FA47B-E7C1-497B-8FFE-788BFF4EFC11}" type="datetime4">
               <a:rPr lang="de-CH"/>
               <a:pPr/>
-              <a:t>16. Mai 2019</a:t>
+              <a:t>18. Mai 2019</a:t>
             </a:fld>
             <a:endParaRPr lang="de-CH">
               <a:solidFill>
@@ -2488,7 +2670,7 @@
             <a:fld id="{DC2001ED-48E2-473D-9391-0CC2286E4E04}" type="datetime4">
               <a:rPr lang="de-CH"/>
               <a:pPr/>
-              <a:t>16. Mai 2019</a:t>
+              <a:t>18. Mai 2019</a:t>
             </a:fld>
             <a:endParaRPr lang="de-CH">
               <a:solidFill>
@@ -2936,7 +3118,7 @@
             <a:fld id="{06D2EBEC-D335-4891-8EE2-E5F19A2114DA}" type="datetime4">
               <a:rPr lang="de-CH"/>
               <a:pPr/>
-              <a:t>16. Mai 2019</a:t>
+              <a:t>18. Mai 2019</a:t>
             </a:fld>
             <a:endParaRPr lang="de-CH">
               <a:solidFill>
@@ -3075,7 +3257,7 @@
             <a:fld id="{BC375444-A4CE-4AEE-A7EE-DA682EFEECCF}" type="datetime4">
               <a:rPr lang="de-CH"/>
               <a:pPr/>
-              <a:t>16. Mai 2019</a:t>
+              <a:t>18. Mai 2019</a:t>
             </a:fld>
             <a:endParaRPr lang="de-CH">
               <a:solidFill>
@@ -3191,7 +3373,7 @@
             <a:fld id="{04EE424D-A955-4F62-8B7E-6EF8C8430D57}" type="datetime4">
               <a:rPr lang="de-CH"/>
               <a:pPr/>
-              <a:t>16. Mai 2019</a:t>
+              <a:t>18. Mai 2019</a:t>
             </a:fld>
             <a:endParaRPr lang="de-CH">
               <a:solidFill>
@@ -3489,7 +3671,7 @@
             <a:fld id="{BE7B0FEC-82BA-44DB-802E-8D67E43E9D46}" type="datetime4">
               <a:rPr lang="de-CH"/>
               <a:pPr/>
-              <a:t>16. Mai 2019</a:t>
+              <a:t>18. Mai 2019</a:t>
             </a:fld>
             <a:endParaRPr lang="de-CH">
               <a:solidFill>
@@ -3767,7 +3949,7 @@
             <a:fld id="{55C4310E-AA52-45A7-B65B-092449D821B1}" type="datetime4">
               <a:rPr lang="de-CH"/>
               <a:pPr/>
-              <a:t>16. Mai 2019</a:t>
+              <a:t>18. Mai 2019</a:t>
             </a:fld>
             <a:endParaRPr lang="de-CH">
               <a:solidFill>
@@ -4211,7 +4393,7 @@
             <a:fld id="{982E0833-EC79-451B-98E6-FF7F74C6A782}" type="datetime4">
               <a:rPr lang="de-CH"/>
               <a:pPr/>
-              <a:t>16. Mai 2019</a:t>
+              <a:t>18. Mai 2019</a:t>
             </a:fld>
             <a:endParaRPr lang="de-CH">
               <a:solidFill>
@@ -4922,7 +5104,7 @@
             <a:fld id="{23AE0199-44D3-47D6-B4EF-C96D573ED5FB}" type="datetime4">
               <a:rPr lang="de-CH" smtClean="0"/>
               <a:pPr/>
-              <a:t>16. Mai 2019</a:t>
+              <a:t>18. Mai 2019</a:t>
             </a:fld>
             <a:endParaRPr lang="de-CH">
               <a:solidFill>
@@ -5647,7 +5829,7 @@
             <a:fld id="{23AE0199-44D3-47D6-B4EF-C96D573ED5FB}" type="datetime4">
               <a:rPr lang="de-CH" smtClean="0"/>
               <a:pPr/>
-              <a:t>16. Mai 2019</a:t>
+              <a:t>18. Mai 2019</a:t>
             </a:fld>
             <a:endParaRPr lang="de-CH">
               <a:solidFill>
@@ -5811,7 +5993,7 @@
             <a:fld id="{23AE0199-44D3-47D6-B4EF-C96D573ED5FB}" type="datetime4">
               <a:rPr lang="de-CH" smtClean="0"/>
               <a:pPr/>
-              <a:t>16. Mai 2019</a:t>
+              <a:t>18. Mai 2019</a:t>
             </a:fld>
             <a:endParaRPr lang="de-CH">
               <a:solidFill>
@@ -5905,7 +6087,7 @@
             <a:fld id="{23AE0199-44D3-47D6-B4EF-C96D573ED5FB}" type="datetime4">
               <a:rPr lang="de-CH" smtClean="0"/>
               <a:pPr/>
-              <a:t>16. Mai 2019</a:t>
+              <a:t>18. Mai 2019</a:t>
             </a:fld>
             <a:endParaRPr lang="de-CH">
               <a:solidFill>
@@ -5993,8 +6175,8 @@
         </p:nvSpPr>
         <p:spPr>
           <a:xfrm>
-            <a:off x="827584" y="2204864"/>
-            <a:ext cx="7200800" cy="1200329"/>
+            <a:off x="179511" y="1700808"/>
+            <a:ext cx="6480715" cy="1569660"/>
           </a:xfrm>
           <a:prstGeom prst="rect">
             <a:avLst/>
@@ -6008,18 +6190,1248 @@
           <a:lstStyle/>
           <a:p>
             <a:r>
+              <a:rPr lang="en-US" altLang="ko-KR" dirty="0">
+                <a:latin typeface="Bauhaus 93" panose="04030905020B02020C02" pitchFamily="82" charset="0"/>
+              </a:rPr>
+              <a:t>∙ </a:t>
+            </a:r>
+            <a:r>
               <a:rPr lang="en-US" altLang="ko-KR" dirty="0"/>
               <a:t>Alphabet Sign Language Detection</a:t>
             </a:r>
           </a:p>
           <a:p>
+            <a:pPr algn="ctr"/>
             <a:endParaRPr lang="en-US" altLang="ko-KR" dirty="0"/>
           </a:p>
           <a:p>
+            <a:pPr algn="ctr"/>
+            <a:endParaRPr lang="en-US" altLang="ko-KR" dirty="0"/>
+          </a:p>
+          <a:p>
+            <a:pPr algn="ctr"/>
             <a:endParaRPr lang="ko-KR" altLang="en-US" dirty="0"/>
           </a:p>
         </p:txBody>
       </p:sp>
+      <p:sp>
+        <p:nvSpPr>
+          <p:cNvPr id="30" name="TextBox 29">
+            <a:extLst>
+              <a:ext uri="{FF2B5EF4-FFF2-40B4-BE49-F238E27FC236}">
+                <a16:creationId xmlns:a16="http://schemas.microsoft.com/office/drawing/2014/main" id="{B1C1957D-C0E9-4CDD-8848-9D3D88EE4A1C}"/>
+              </a:ext>
+            </a:extLst>
+          </p:cNvPr>
+          <p:cNvSpPr txBox="1"/>
+          <p:nvPr/>
+        </p:nvSpPr>
+        <p:spPr>
+          <a:xfrm>
+            <a:off x="251520" y="5315724"/>
+            <a:ext cx="7992888" cy="1569660"/>
+          </a:xfrm>
+          <a:prstGeom prst="rect">
+            <a:avLst/>
+          </a:prstGeom>
+          <a:noFill/>
+        </p:spPr>
+        <p:txBody>
+          <a:bodyPr wrap="square" rtlCol="0">
+            <a:spAutoFit/>
+          </a:bodyPr>
+          <a:lstStyle/>
+          <a:p>
+            <a:r>
+              <a:rPr lang="en-US" altLang="ko-KR" dirty="0">
+                <a:latin typeface="Bauhaus 93" panose="04030905020B02020C02" pitchFamily="82" charset="0"/>
+              </a:rPr>
+              <a:t>∙ </a:t>
+            </a:r>
+            <a:r>
+              <a:rPr lang="en-US" altLang="ko-KR" dirty="0"/>
+              <a:t>Achieve better result with different settings </a:t>
+            </a:r>
+          </a:p>
+          <a:p>
+            <a:pPr algn="ctr"/>
+            <a:endParaRPr lang="en-US" altLang="ko-KR" dirty="0"/>
+          </a:p>
+          <a:p>
+            <a:pPr algn="ctr"/>
+            <a:endParaRPr lang="en-US" altLang="ko-KR" dirty="0"/>
+          </a:p>
+          <a:p>
+            <a:pPr algn="ctr"/>
+            <a:endParaRPr lang="ko-KR" altLang="en-US" dirty="0"/>
+          </a:p>
+        </p:txBody>
+      </p:sp>
+      <p:grpSp>
+        <p:nvGrpSpPr>
+          <p:cNvPr id="76" name="Group 75">
+            <a:extLst>
+              <a:ext uri="{FF2B5EF4-FFF2-40B4-BE49-F238E27FC236}">
+                <a16:creationId xmlns:a16="http://schemas.microsoft.com/office/drawing/2014/main" id="{B3C68ECF-FB34-49D0-A9F3-F1F82E37158E}"/>
+              </a:ext>
+            </a:extLst>
+          </p:cNvPr>
+          <p:cNvGrpSpPr/>
+          <p:nvPr/>
+        </p:nvGrpSpPr>
+        <p:grpSpPr>
+          <a:xfrm>
+            <a:off x="544787" y="2708920"/>
+            <a:ext cx="8059661" cy="2232248"/>
+            <a:chOff x="179513" y="2276872"/>
+            <a:chExt cx="8059661" cy="2232248"/>
+          </a:xfrm>
+        </p:grpSpPr>
+        <p:pic>
+          <p:nvPicPr>
+            <p:cNvPr id="43" name="Picture 42" descr="A close up of an office&#10;&#10;Description automatically generated">
+              <a:extLst>
+                <a:ext uri="{FF2B5EF4-FFF2-40B4-BE49-F238E27FC236}">
+                  <a16:creationId xmlns:a16="http://schemas.microsoft.com/office/drawing/2014/main" id="{5EA57724-9E0B-4459-A622-3639A9587123}"/>
+                </a:ext>
+              </a:extLst>
+            </p:cNvPr>
+            <p:cNvPicPr>
+              <a:picLocks noChangeAspect="1"/>
+            </p:cNvPicPr>
+            <p:nvPr/>
+          </p:nvPicPr>
+          <p:blipFill>
+            <a:blip r:embed="rId3">
+              <a:extLst>
+                <a:ext uri="{28A0092B-C50C-407E-A947-70E740481C1C}">
+                  <a14:useLocalDpi xmlns:a14="http://schemas.microsoft.com/office/drawing/2010/main" val="0"/>
+                </a:ext>
+              </a:extLst>
+            </a:blip>
+            <a:stretch>
+              <a:fillRect/>
+            </a:stretch>
+          </p:blipFill>
+          <p:spPr>
+            <a:xfrm>
+              <a:off x="517699" y="3190333"/>
+              <a:ext cx="581428" cy="656199"/>
+            </a:xfrm>
+            <a:prstGeom prst="rect">
+              <a:avLst/>
+            </a:prstGeom>
+          </p:spPr>
+        </p:pic>
+        <p:sp>
+          <p:nvSpPr>
+            <p:cNvPr id="36" name="Arrow: Right 35">
+              <a:extLst>
+                <a:ext uri="{FF2B5EF4-FFF2-40B4-BE49-F238E27FC236}">
+                  <a16:creationId xmlns:a16="http://schemas.microsoft.com/office/drawing/2014/main" id="{321F6303-9689-4649-97E3-2690552B0517}"/>
+                </a:ext>
+              </a:extLst>
+            </p:cNvPr>
+            <p:cNvSpPr/>
+            <p:nvPr/>
+          </p:nvSpPr>
+          <p:spPr bwMode="auto">
+            <a:xfrm>
+              <a:off x="3414412" y="2865494"/>
+              <a:ext cx="288681" cy="313828"/>
+            </a:xfrm>
+            <a:prstGeom prst="rightArrow">
+              <a:avLst/>
+            </a:prstGeom>
+            <a:solidFill>
+              <a:srgbClr val="0070C0"/>
+            </a:solidFill>
+            <a:ln w="9525" cap="flat" cmpd="sng" algn="ctr">
+              <a:noFill/>
+              <a:prstDash val="solid"/>
+              <a:round/>
+              <a:headEnd type="none" w="med" len="med"/>
+              <a:tailEnd type="none" w="med" len="med"/>
+            </a:ln>
+            <a:effectLst/>
+            <a:extLst/>
+          </p:spPr>
+          <p:txBody>
+            <a:bodyPr vert="horz" wrap="square" lIns="91440" tIns="45720" rIns="91440" bIns="45720" numCol="1" rtlCol="0" anchor="t" anchorCtr="0" compatLnSpc="1">
+              <a:prstTxWarp prst="textNoShape">
+                <a:avLst/>
+              </a:prstTxWarp>
+            </a:bodyPr>
+            <a:lstStyle/>
+            <a:p>
+              <a:pPr marL="0" marR="0" indent="0" algn="l" defTabSz="914400" rtl="0" eaLnBrk="0" fontAlgn="base" latinLnBrk="0" hangingPunct="0">
+                <a:lnSpc>
+                  <a:spcPct val="100000"/>
+                </a:lnSpc>
+                <a:spcBef>
+                  <a:spcPct val="0"/>
+                </a:spcBef>
+                <a:spcAft>
+                  <a:spcPct val="0"/>
+                </a:spcAft>
+                <a:buClrTx/>
+                <a:buSzTx/>
+                <a:buFontTx/>
+                <a:buNone/>
+                <a:tabLst/>
+              </a:pPr>
+              <a:endParaRPr kumimoji="0" lang="ko-KR" altLang="en-US" sz="2400" i="0" u="none" strike="noStrike" normalizeH="0" baseline="0" dirty="0">
+                <a:ln w="0">
+                  <a:noFill/>
+                </a:ln>
+                <a:solidFill>
+                  <a:schemeClr val="accent1"/>
+                </a:solidFill>
+                <a:effectLst>
+                  <a:outerShdw blurRad="38100" dist="25400" dir="5400000" algn="ctr" rotWithShape="0">
+                    <a:srgbClr val="6E747A">
+                      <a:alpha val="43000"/>
+                    </a:srgbClr>
+                  </a:outerShdw>
+                </a:effectLst>
+                <a:latin typeface="Arial" charset="0"/>
+              </a:endParaRPr>
+            </a:p>
+          </p:txBody>
+        </p:sp>
+        <p:sp>
+          <p:nvSpPr>
+            <p:cNvPr id="24" name="Rectangle: Rounded Corners 23">
+              <a:extLst>
+                <a:ext uri="{FF2B5EF4-FFF2-40B4-BE49-F238E27FC236}">
+                  <a16:creationId xmlns:a16="http://schemas.microsoft.com/office/drawing/2014/main" id="{57F71E4D-77A6-429B-9DED-5863444133D9}"/>
+                </a:ext>
+              </a:extLst>
+            </p:cNvPr>
+            <p:cNvSpPr/>
+            <p:nvPr/>
+          </p:nvSpPr>
+          <p:spPr bwMode="auto">
+            <a:xfrm>
+              <a:off x="2105959" y="2603885"/>
+              <a:ext cx="1207803" cy="948058"/>
+            </a:xfrm>
+            <a:prstGeom prst="roundRect">
+              <a:avLst/>
+            </a:prstGeom>
+            <a:solidFill>
+              <a:srgbClr val="E6EBFA"/>
+            </a:solidFill>
+            <a:ln w="9525" cap="flat" cmpd="sng" algn="ctr">
+              <a:noFill/>
+              <a:prstDash val="solid"/>
+              <a:round/>
+              <a:headEnd type="none" w="med" len="med"/>
+              <a:tailEnd type="none" w="med" len="med"/>
+            </a:ln>
+            <a:effectLst/>
+            <a:extLst/>
+          </p:spPr>
+          <p:txBody>
+            <a:bodyPr vert="horz" wrap="square" lIns="91440" tIns="45720" rIns="91440" bIns="45720" numCol="1" rtlCol="0" anchor="t" anchorCtr="0" compatLnSpc="1">
+              <a:prstTxWarp prst="textNoShape">
+                <a:avLst/>
+              </a:prstTxWarp>
+            </a:bodyPr>
+            <a:lstStyle/>
+            <a:p>
+              <a:pPr marL="0" marR="0" indent="0" algn="ctr" defTabSz="914400" rtl="0" eaLnBrk="0" fontAlgn="base" latinLnBrk="0" hangingPunct="0">
+                <a:lnSpc>
+                  <a:spcPct val="100000"/>
+                </a:lnSpc>
+                <a:spcBef>
+                  <a:spcPct val="0"/>
+                </a:spcBef>
+                <a:spcAft>
+                  <a:spcPct val="0"/>
+                </a:spcAft>
+                <a:buClrTx/>
+                <a:buSzTx/>
+                <a:buFontTx/>
+                <a:buNone/>
+                <a:tabLst/>
+              </a:pPr>
+              <a:endParaRPr kumimoji="0" lang="en-US" altLang="ko-KR" sz="2400" b="0" i="0" u="none" strike="noStrike" cap="none" normalizeH="0" baseline="0" dirty="0">
+                <a:ln>
+                  <a:noFill/>
+                </a:ln>
+                <a:solidFill>
+                  <a:schemeClr val="tx1"/>
+                </a:solidFill>
+                <a:effectLst/>
+                <a:latin typeface="Arial" charset="0"/>
+              </a:endParaRPr>
+            </a:p>
+            <a:p>
+              <a:pPr marL="0" marR="0" indent="0" algn="ctr" defTabSz="914400" rtl="0" eaLnBrk="0" fontAlgn="base" latinLnBrk="0" hangingPunct="0">
+                <a:lnSpc>
+                  <a:spcPct val="100000"/>
+                </a:lnSpc>
+                <a:spcBef>
+                  <a:spcPct val="0"/>
+                </a:spcBef>
+                <a:spcAft>
+                  <a:spcPct val="0"/>
+                </a:spcAft>
+                <a:buClrTx/>
+                <a:buSzTx/>
+                <a:buFontTx/>
+                <a:buNone/>
+                <a:tabLst/>
+              </a:pPr>
+              <a:endParaRPr kumimoji="0" lang="ko-KR" altLang="en-US" sz="2400" b="0" i="0" u="none" strike="noStrike" cap="none" normalizeH="0" baseline="0" dirty="0">
+                <a:ln>
+                  <a:noFill/>
+                </a:ln>
+                <a:solidFill>
+                  <a:schemeClr val="tx1"/>
+                </a:solidFill>
+                <a:effectLst/>
+                <a:latin typeface="Arial" charset="0"/>
+              </a:endParaRPr>
+            </a:p>
+          </p:txBody>
+        </p:sp>
+        <p:pic>
+          <p:nvPicPr>
+            <p:cNvPr id="34" name="Picture 33" descr="A hand holding a cellphone&#10;&#10;Description automatically generated">
+              <a:extLst>
+                <a:ext uri="{FF2B5EF4-FFF2-40B4-BE49-F238E27FC236}">
+                  <a16:creationId xmlns:a16="http://schemas.microsoft.com/office/drawing/2014/main" id="{659E67D4-4861-48EE-BD69-4513115B5A55}"/>
+                </a:ext>
+              </a:extLst>
+            </p:cNvPr>
+            <p:cNvPicPr>
+              <a:picLocks noChangeAspect="1"/>
+            </p:cNvPicPr>
+            <p:nvPr/>
+          </p:nvPicPr>
+          <p:blipFill>
+            <a:blip r:embed="rId4">
+              <a:extLst>
+                <a:ext uri="{28A0092B-C50C-407E-A947-70E740481C1C}">
+                  <a14:useLocalDpi xmlns:a14="http://schemas.microsoft.com/office/drawing/2010/main" val="0"/>
+                </a:ext>
+              </a:extLst>
+            </a:blip>
+            <a:stretch>
+              <a:fillRect/>
+            </a:stretch>
+          </p:blipFill>
+          <p:spPr>
+            <a:xfrm>
+              <a:off x="179513" y="2658304"/>
+              <a:ext cx="615880" cy="811509"/>
+            </a:xfrm>
+            <a:prstGeom prst="rect">
+              <a:avLst/>
+            </a:prstGeom>
+          </p:spPr>
+        </p:pic>
+        <p:sp>
+          <p:nvSpPr>
+            <p:cNvPr id="35" name="Arrow: Right 34">
+              <a:extLst>
+                <a:ext uri="{FF2B5EF4-FFF2-40B4-BE49-F238E27FC236}">
+                  <a16:creationId xmlns:a16="http://schemas.microsoft.com/office/drawing/2014/main" id="{8DF1D799-8AB8-4BD5-80DE-21AED0ABCBF0}"/>
+                </a:ext>
+              </a:extLst>
+            </p:cNvPr>
+            <p:cNvSpPr/>
+            <p:nvPr/>
+          </p:nvSpPr>
+          <p:spPr bwMode="auto">
+            <a:xfrm>
+              <a:off x="1703358" y="2891232"/>
+              <a:ext cx="277134" cy="301275"/>
+            </a:xfrm>
+            <a:prstGeom prst="rightArrow">
+              <a:avLst/>
+            </a:prstGeom>
+            <a:solidFill>
+              <a:srgbClr val="0070C0"/>
+            </a:solidFill>
+            <a:ln w="9525" cap="flat" cmpd="sng" algn="ctr">
+              <a:noFill/>
+              <a:prstDash val="solid"/>
+              <a:round/>
+              <a:headEnd type="none" w="med" len="med"/>
+              <a:tailEnd type="none" w="med" len="med"/>
+            </a:ln>
+            <a:effectLst/>
+            <a:extLst/>
+          </p:spPr>
+          <p:txBody>
+            <a:bodyPr vert="horz" wrap="square" lIns="91440" tIns="45720" rIns="91440" bIns="45720" numCol="1" rtlCol="0" anchor="t" anchorCtr="0" compatLnSpc="1">
+              <a:prstTxWarp prst="textNoShape">
+                <a:avLst/>
+              </a:prstTxWarp>
+            </a:bodyPr>
+            <a:lstStyle/>
+            <a:p>
+              <a:pPr marL="0" marR="0" indent="0" algn="l" defTabSz="914400" rtl="0" eaLnBrk="0" fontAlgn="base" latinLnBrk="0" hangingPunct="0">
+                <a:lnSpc>
+                  <a:spcPct val="100000"/>
+                </a:lnSpc>
+                <a:spcBef>
+                  <a:spcPct val="0"/>
+                </a:spcBef>
+                <a:spcAft>
+                  <a:spcPct val="0"/>
+                </a:spcAft>
+                <a:buClrTx/>
+                <a:buSzTx/>
+                <a:buFontTx/>
+                <a:buNone/>
+                <a:tabLst/>
+              </a:pPr>
+              <a:endParaRPr kumimoji="0" lang="ko-KR" altLang="en-US" sz="2400" i="0" u="none" strike="noStrike" normalizeH="0" baseline="0" dirty="0">
+                <a:ln w="0">
+                  <a:noFill/>
+                </a:ln>
+                <a:solidFill>
+                  <a:schemeClr val="accent1"/>
+                </a:solidFill>
+                <a:effectLst>
+                  <a:outerShdw blurRad="38100" dist="25400" dir="5400000" algn="ctr" rotWithShape="0">
+                    <a:srgbClr val="6E747A">
+                      <a:alpha val="43000"/>
+                    </a:srgbClr>
+                  </a:outerShdw>
+                </a:effectLst>
+                <a:latin typeface="Arial" charset="0"/>
+              </a:endParaRPr>
+            </a:p>
+          </p:txBody>
+        </p:sp>
+        <p:pic>
+          <p:nvPicPr>
+            <p:cNvPr id="39" name="Picture 38" descr="A picture containing animal, invertebrate&#10;&#10;Description automatically generated">
+              <a:extLst>
+                <a:ext uri="{FF2B5EF4-FFF2-40B4-BE49-F238E27FC236}">
+                  <a16:creationId xmlns:a16="http://schemas.microsoft.com/office/drawing/2014/main" id="{987497EF-BA8A-4823-8CB9-16E8E475227D}"/>
+                </a:ext>
+              </a:extLst>
+            </p:cNvPr>
+            <p:cNvPicPr>
+              <a:picLocks noChangeAspect="1"/>
+            </p:cNvPicPr>
+            <p:nvPr/>
+          </p:nvPicPr>
+          <p:blipFill>
+            <a:blip r:embed="rId5">
+              <a:extLst>
+                <a:ext uri="{28A0092B-C50C-407E-A947-70E740481C1C}">
+                  <a14:useLocalDpi xmlns:a14="http://schemas.microsoft.com/office/drawing/2010/main" val="0"/>
+                </a:ext>
+              </a:extLst>
+            </a:blip>
+            <a:stretch>
+              <a:fillRect/>
+            </a:stretch>
+          </p:blipFill>
+          <p:spPr>
+            <a:xfrm>
+              <a:off x="614323" y="2276872"/>
+              <a:ext cx="545388" cy="896031"/>
+            </a:xfrm>
+            <a:prstGeom prst="rect">
+              <a:avLst/>
+            </a:prstGeom>
+          </p:spPr>
+        </p:pic>
+        <p:pic>
+          <p:nvPicPr>
+            <p:cNvPr id="41" name="Picture 40" descr="A picture containing person, indoor, animal, invertebrate&#10;&#10;Description automatically generated">
+              <a:extLst>
+                <a:ext uri="{FF2B5EF4-FFF2-40B4-BE49-F238E27FC236}">
+                  <a16:creationId xmlns:a16="http://schemas.microsoft.com/office/drawing/2014/main" id="{949A2DC5-7E6B-4DD2-8D97-538565B1D24E}"/>
+                </a:ext>
+              </a:extLst>
+            </p:cNvPr>
+            <p:cNvPicPr>
+              <a:picLocks noChangeAspect="1"/>
+            </p:cNvPicPr>
+            <p:nvPr/>
+          </p:nvPicPr>
+          <p:blipFill>
+            <a:blip r:embed="rId6">
+              <a:extLst>
+                <a:ext uri="{28A0092B-C50C-407E-A947-70E740481C1C}">
+                  <a14:useLocalDpi xmlns:a14="http://schemas.microsoft.com/office/drawing/2010/main" val="0"/>
+                </a:ext>
+              </a:extLst>
+            </a:blip>
+            <a:stretch>
+              <a:fillRect/>
+            </a:stretch>
+          </p:blipFill>
+          <p:spPr>
+            <a:xfrm>
+              <a:off x="1000819" y="2645828"/>
+              <a:ext cx="615880" cy="886771"/>
+            </a:xfrm>
+            <a:prstGeom prst="rect">
+              <a:avLst/>
+            </a:prstGeom>
+          </p:spPr>
+        </p:pic>
+        <p:sp>
+          <p:nvSpPr>
+            <p:cNvPr id="46" name="Rectangle 45">
+              <a:extLst>
+                <a:ext uri="{FF2B5EF4-FFF2-40B4-BE49-F238E27FC236}">
+                  <a16:creationId xmlns:a16="http://schemas.microsoft.com/office/drawing/2014/main" id="{51B3F9AB-170F-46E7-9A4B-FEE7A5D84D21}"/>
+                </a:ext>
+              </a:extLst>
+            </p:cNvPr>
+            <p:cNvSpPr/>
+            <p:nvPr/>
+          </p:nvSpPr>
+          <p:spPr>
+            <a:xfrm>
+              <a:off x="3666038" y="3044296"/>
+              <a:ext cx="401906" cy="475224"/>
+            </a:xfrm>
+            <a:prstGeom prst="rect">
+              <a:avLst/>
+            </a:prstGeom>
+            <a:noFill/>
+          </p:spPr>
+          <p:txBody>
+            <a:bodyPr wrap="square" lIns="91440" tIns="45720" rIns="91440" bIns="45720">
+              <a:spAutoFit/>
+            </a:bodyPr>
+            <a:lstStyle/>
+            <a:p>
+              <a:pPr algn="ctr"/>
+              <a:r>
+                <a:rPr lang="en-US" altLang="ko-KR" sz="2800" dirty="0">
+                  <a:ln w="0"/>
+                  <a:solidFill>
+                    <a:schemeClr val="bg2">
+                      <a:lumMod val="50000"/>
+                    </a:schemeClr>
+                  </a:solidFill>
+                  <a:effectLst>
+                    <a:outerShdw blurRad="38100" dist="19050" dir="2700000" algn="tl" rotWithShape="0">
+                      <a:schemeClr val="dk1">
+                        <a:alpha val="40000"/>
+                      </a:schemeClr>
+                    </a:outerShdw>
+                  </a:effectLst>
+                </a:rPr>
+                <a:t>c</a:t>
+              </a:r>
+            </a:p>
+          </p:txBody>
+        </p:sp>
+        <p:sp>
+          <p:nvSpPr>
+            <p:cNvPr id="47" name="Rectangle 46">
+              <a:extLst>
+                <a:ext uri="{FF2B5EF4-FFF2-40B4-BE49-F238E27FC236}">
+                  <a16:creationId xmlns:a16="http://schemas.microsoft.com/office/drawing/2014/main" id="{A0367C83-69C0-4D18-9006-F849D1BDBDF1}"/>
+                </a:ext>
+              </a:extLst>
+            </p:cNvPr>
+            <p:cNvSpPr/>
+            <p:nvPr/>
+          </p:nvSpPr>
+          <p:spPr>
+            <a:xfrm>
+              <a:off x="3714348" y="2717283"/>
+              <a:ext cx="318055" cy="523220"/>
+            </a:xfrm>
+            <a:prstGeom prst="rect">
+              <a:avLst/>
+            </a:prstGeom>
+            <a:noFill/>
+          </p:spPr>
+          <p:txBody>
+            <a:bodyPr wrap="square" lIns="91440" tIns="45720" rIns="91440" bIns="45720">
+              <a:spAutoFit/>
+            </a:bodyPr>
+            <a:lstStyle/>
+            <a:p>
+              <a:pPr algn="ctr"/>
+              <a:r>
+                <a:rPr lang="en-US" altLang="ko-KR" sz="2800" dirty="0">
+                  <a:ln w="0"/>
+                  <a:solidFill>
+                    <a:schemeClr val="bg2">
+                      <a:lumMod val="50000"/>
+                    </a:schemeClr>
+                  </a:solidFill>
+                  <a:effectLst>
+                    <a:outerShdw blurRad="38100" dist="19050" dir="2700000" algn="tl" rotWithShape="0">
+                      <a:schemeClr val="dk1">
+                        <a:alpha val="40000"/>
+                      </a:schemeClr>
+                    </a:outerShdw>
+                  </a:effectLst>
+                </a:rPr>
+                <a:t>b</a:t>
+              </a:r>
+            </a:p>
+          </p:txBody>
+        </p:sp>
+        <p:sp>
+          <p:nvSpPr>
+            <p:cNvPr id="49" name="TextBox 48">
+              <a:extLst>
+                <a:ext uri="{FF2B5EF4-FFF2-40B4-BE49-F238E27FC236}">
+                  <a16:creationId xmlns:a16="http://schemas.microsoft.com/office/drawing/2014/main" id="{BE41DFAC-D3E0-46C4-8656-F60D80752849}"/>
+                </a:ext>
+              </a:extLst>
+            </p:cNvPr>
+            <p:cNvSpPr txBox="1"/>
+            <p:nvPr/>
+          </p:nvSpPr>
+          <p:spPr>
+            <a:xfrm>
+              <a:off x="2149084" y="2924944"/>
+              <a:ext cx="1164678" cy="338554"/>
+            </a:xfrm>
+            <a:prstGeom prst="rect">
+              <a:avLst/>
+            </a:prstGeom>
+            <a:noFill/>
+          </p:spPr>
+          <p:txBody>
+            <a:bodyPr wrap="square" rtlCol="0">
+              <a:spAutoFit/>
+            </a:bodyPr>
+            <a:lstStyle/>
+            <a:p>
+              <a:r>
+                <a:rPr lang="en-US" altLang="ko-KR" sz="1600" dirty="0" err="1"/>
+                <a:t>DenseNet</a:t>
+              </a:r>
+              <a:endParaRPr lang="ko-KR" altLang="en-US" sz="1600" dirty="0"/>
+            </a:p>
+          </p:txBody>
+        </p:sp>
+        <p:sp>
+          <p:nvSpPr>
+            <p:cNvPr id="50" name="Rectangle 49">
+              <a:extLst>
+                <a:ext uri="{FF2B5EF4-FFF2-40B4-BE49-F238E27FC236}">
+                  <a16:creationId xmlns:a16="http://schemas.microsoft.com/office/drawing/2014/main" id="{2CBFA7BF-ECE0-428A-B591-01024540034E}"/>
+                </a:ext>
+              </a:extLst>
+            </p:cNvPr>
+            <p:cNvSpPr/>
+            <p:nvPr/>
+          </p:nvSpPr>
+          <p:spPr>
+            <a:xfrm>
+              <a:off x="3700259" y="2342275"/>
+              <a:ext cx="318055" cy="475224"/>
+            </a:xfrm>
+            <a:prstGeom prst="rect">
+              <a:avLst/>
+            </a:prstGeom>
+            <a:noFill/>
+          </p:spPr>
+          <p:txBody>
+            <a:bodyPr wrap="square" lIns="91440" tIns="45720" rIns="91440" bIns="45720">
+              <a:spAutoFit/>
+            </a:bodyPr>
+            <a:lstStyle/>
+            <a:p>
+              <a:pPr algn="ctr"/>
+              <a:r>
+                <a:rPr lang="en-US" altLang="ko-KR" sz="2800" dirty="0">
+                  <a:ln w="0"/>
+                  <a:effectLst>
+                    <a:outerShdw blurRad="38100" dist="19050" dir="2700000" algn="tl" rotWithShape="0">
+                      <a:schemeClr val="dk1">
+                        <a:alpha val="40000"/>
+                      </a:schemeClr>
+                    </a:outerShdw>
+                  </a:effectLst>
+                </a:rPr>
+                <a:t>a</a:t>
+              </a:r>
+            </a:p>
+          </p:txBody>
+        </p:sp>
+        <p:cxnSp>
+          <p:nvCxnSpPr>
+            <p:cNvPr id="52" name="Connector: Elbow 51">
+              <a:extLst>
+                <a:ext uri="{FF2B5EF4-FFF2-40B4-BE49-F238E27FC236}">
+                  <a16:creationId xmlns:a16="http://schemas.microsoft.com/office/drawing/2014/main" id="{7E67A941-4F6C-4C10-8A81-E5CE295AD4E1}"/>
+                </a:ext>
+              </a:extLst>
+            </p:cNvPr>
+            <p:cNvCxnSpPr>
+              <a:stCxn id="50" idx="0"/>
+              <a:endCxn id="24" idx="0"/>
+            </p:cNvCxnSpPr>
+            <p:nvPr/>
+          </p:nvCxnSpPr>
+          <p:spPr bwMode="auto">
+            <a:xfrm rot="16200000" flipH="1" flipV="1">
+              <a:off x="3153769" y="1898366"/>
+              <a:ext cx="261610" cy="1149426"/>
+            </a:xfrm>
+            <a:prstGeom prst="bentConnector3">
+              <a:avLst>
+                <a:gd name="adj1" fmla="val -79366"/>
+              </a:avLst>
+            </a:prstGeom>
+            <a:solidFill>
+              <a:schemeClr val="accent1"/>
+            </a:solidFill>
+            <a:ln w="9525" cap="flat" cmpd="sng" algn="ctr">
+              <a:solidFill>
+                <a:schemeClr val="tx1"/>
+              </a:solidFill>
+              <a:prstDash val="solid"/>
+              <a:round/>
+              <a:headEnd type="none" w="med" len="med"/>
+              <a:tailEnd type="triangle"/>
+            </a:ln>
+            <a:effectLst/>
+            <a:extLst>
+              <a:ext uri="{AF507438-7753-43E0-B8FC-AC1667EBCBE1}">
+                <a14:hiddenEffects xmlns:a14="http://schemas.microsoft.com/office/drawing/2010/main">
+                  <a:effectLst>
+                    <a:outerShdw dist="35921" dir="2700000" algn="ctr" rotWithShape="0">
+                      <a:schemeClr val="bg2"/>
+                    </a:outerShdw>
+                  </a:effectLst>
+                </a14:hiddenEffects>
+              </a:ext>
+            </a:extLst>
+          </p:spPr>
+        </p:cxnSp>
+        <p:pic>
+          <p:nvPicPr>
+            <p:cNvPr id="57" name="Picture 56" descr="A picture containing animal, invertebrate&#10;&#10;Description automatically generated">
+              <a:extLst>
+                <a:ext uri="{FF2B5EF4-FFF2-40B4-BE49-F238E27FC236}">
+                  <a16:creationId xmlns:a16="http://schemas.microsoft.com/office/drawing/2014/main" id="{525B5E8D-72FD-430E-B501-9DD9FCDFDB87}"/>
+                </a:ext>
+              </a:extLst>
+            </p:cNvPr>
+            <p:cNvPicPr>
+              <a:picLocks noChangeAspect="1"/>
+            </p:cNvPicPr>
+            <p:nvPr/>
+          </p:nvPicPr>
+          <p:blipFill>
+            <a:blip r:embed="rId7">
+              <a:extLst>
+                <a:ext uri="{28A0092B-C50C-407E-A947-70E740481C1C}">
+                  <a14:useLocalDpi xmlns:a14="http://schemas.microsoft.com/office/drawing/2010/main" val="0"/>
+                </a:ext>
+              </a:extLst>
+            </a:blip>
+            <a:stretch>
+              <a:fillRect/>
+            </a:stretch>
+          </p:blipFill>
+          <p:spPr>
+            <a:xfrm>
+              <a:off x="4669566" y="2611369"/>
+              <a:ext cx="550506" cy="858444"/>
+            </a:xfrm>
+            <a:prstGeom prst="rect">
+              <a:avLst/>
+            </a:prstGeom>
+          </p:spPr>
+        </p:pic>
+        <p:sp>
+          <p:nvSpPr>
+            <p:cNvPr id="65" name="Rectangle: Rounded Corners 64">
+              <a:extLst>
+                <a:ext uri="{FF2B5EF4-FFF2-40B4-BE49-F238E27FC236}">
+                  <a16:creationId xmlns:a16="http://schemas.microsoft.com/office/drawing/2014/main" id="{67C59FAC-1865-4378-8D09-3589D9417B62}"/>
+                </a:ext>
+              </a:extLst>
+            </p:cNvPr>
+            <p:cNvSpPr/>
+            <p:nvPr/>
+          </p:nvSpPr>
+          <p:spPr bwMode="auto">
+            <a:xfrm>
+              <a:off x="6012160" y="2552950"/>
+              <a:ext cx="1207803" cy="948058"/>
+            </a:xfrm>
+            <a:prstGeom prst="roundRect">
+              <a:avLst/>
+            </a:prstGeom>
+            <a:solidFill>
+              <a:srgbClr val="E6EBFA"/>
+            </a:solidFill>
+            <a:ln w="9525" cap="flat" cmpd="sng" algn="ctr">
+              <a:noFill/>
+              <a:prstDash val="solid"/>
+              <a:round/>
+              <a:headEnd type="none" w="med" len="med"/>
+              <a:tailEnd type="none" w="med" len="med"/>
+            </a:ln>
+            <a:effectLst/>
+            <a:extLst/>
+          </p:spPr>
+          <p:txBody>
+            <a:bodyPr vert="horz" wrap="square" lIns="91440" tIns="45720" rIns="91440" bIns="45720" numCol="1" rtlCol="0" anchor="t" anchorCtr="0" compatLnSpc="1">
+              <a:prstTxWarp prst="textNoShape">
+                <a:avLst/>
+              </a:prstTxWarp>
+            </a:bodyPr>
+            <a:lstStyle/>
+            <a:p>
+              <a:pPr marL="0" marR="0" indent="0" algn="ctr" defTabSz="914400" rtl="0" eaLnBrk="0" fontAlgn="base" latinLnBrk="0" hangingPunct="0">
+                <a:lnSpc>
+                  <a:spcPct val="100000"/>
+                </a:lnSpc>
+                <a:spcBef>
+                  <a:spcPct val="0"/>
+                </a:spcBef>
+                <a:spcAft>
+                  <a:spcPct val="0"/>
+                </a:spcAft>
+                <a:buClrTx/>
+                <a:buSzTx/>
+                <a:buFontTx/>
+                <a:buNone/>
+                <a:tabLst/>
+              </a:pPr>
+              <a:endParaRPr kumimoji="0" lang="en-US" altLang="ko-KR" sz="2400" b="0" i="0" u="none" strike="noStrike" cap="none" normalizeH="0" baseline="0" dirty="0">
+                <a:ln>
+                  <a:noFill/>
+                </a:ln>
+                <a:solidFill>
+                  <a:schemeClr val="tx1"/>
+                </a:solidFill>
+                <a:effectLst/>
+                <a:latin typeface="Arial" charset="0"/>
+              </a:endParaRPr>
+            </a:p>
+            <a:p>
+              <a:pPr marL="0" marR="0" indent="0" algn="ctr" defTabSz="914400" rtl="0" eaLnBrk="0" fontAlgn="base" latinLnBrk="0" hangingPunct="0">
+                <a:lnSpc>
+                  <a:spcPct val="100000"/>
+                </a:lnSpc>
+                <a:spcBef>
+                  <a:spcPct val="0"/>
+                </a:spcBef>
+                <a:spcAft>
+                  <a:spcPct val="0"/>
+                </a:spcAft>
+                <a:buClrTx/>
+                <a:buSzTx/>
+                <a:buFontTx/>
+                <a:buNone/>
+                <a:tabLst/>
+              </a:pPr>
+              <a:endParaRPr kumimoji="0" lang="ko-KR" altLang="en-US" sz="2400" b="0" i="0" u="none" strike="noStrike" cap="none" normalizeH="0" baseline="0" dirty="0">
+                <a:ln>
+                  <a:noFill/>
+                </a:ln>
+                <a:solidFill>
+                  <a:schemeClr val="tx1"/>
+                </a:solidFill>
+                <a:effectLst/>
+                <a:latin typeface="Arial" charset="0"/>
+              </a:endParaRPr>
+            </a:p>
+          </p:txBody>
+        </p:sp>
+        <p:sp>
+          <p:nvSpPr>
+            <p:cNvPr id="66" name="TextBox 65">
+              <a:extLst>
+                <a:ext uri="{FF2B5EF4-FFF2-40B4-BE49-F238E27FC236}">
+                  <a16:creationId xmlns:a16="http://schemas.microsoft.com/office/drawing/2014/main" id="{97929BAF-4EFF-4ADB-99DD-4F14F780E58E}"/>
+                </a:ext>
+              </a:extLst>
+            </p:cNvPr>
+            <p:cNvSpPr txBox="1"/>
+            <p:nvPr/>
+          </p:nvSpPr>
+          <p:spPr>
+            <a:xfrm>
+              <a:off x="6084168" y="2852936"/>
+              <a:ext cx="1164678" cy="338554"/>
+            </a:xfrm>
+            <a:prstGeom prst="rect">
+              <a:avLst/>
+            </a:prstGeom>
+            <a:noFill/>
+          </p:spPr>
+          <p:txBody>
+            <a:bodyPr wrap="square" rtlCol="0">
+              <a:spAutoFit/>
+            </a:bodyPr>
+            <a:lstStyle/>
+            <a:p>
+              <a:r>
+                <a:rPr lang="en-US" altLang="ko-KR" sz="1600" dirty="0" err="1"/>
+                <a:t>DenseNet</a:t>
+              </a:r>
+              <a:endParaRPr lang="ko-KR" altLang="en-US" sz="1600" dirty="0"/>
+            </a:p>
+          </p:txBody>
+        </p:sp>
+        <p:sp>
+          <p:nvSpPr>
+            <p:cNvPr id="67" name="Arrow: Right 66">
+              <a:extLst>
+                <a:ext uri="{FF2B5EF4-FFF2-40B4-BE49-F238E27FC236}">
+                  <a16:creationId xmlns:a16="http://schemas.microsoft.com/office/drawing/2014/main" id="{32F07A9C-CF30-4E0E-A584-EBD9C81F1800}"/>
+                </a:ext>
+              </a:extLst>
+            </p:cNvPr>
+            <p:cNvSpPr/>
+            <p:nvPr/>
+          </p:nvSpPr>
+          <p:spPr bwMode="auto">
+            <a:xfrm>
+              <a:off x="5546010" y="2865494"/>
+              <a:ext cx="288681" cy="313828"/>
+            </a:xfrm>
+            <a:prstGeom prst="rightArrow">
+              <a:avLst/>
+            </a:prstGeom>
+            <a:solidFill>
+              <a:srgbClr val="0070C0"/>
+            </a:solidFill>
+            <a:ln w="9525" cap="flat" cmpd="sng" algn="ctr">
+              <a:noFill/>
+              <a:prstDash val="solid"/>
+              <a:round/>
+              <a:headEnd type="none" w="med" len="med"/>
+              <a:tailEnd type="none" w="med" len="med"/>
+            </a:ln>
+            <a:effectLst/>
+            <a:extLst/>
+          </p:spPr>
+          <p:txBody>
+            <a:bodyPr vert="horz" wrap="square" lIns="91440" tIns="45720" rIns="91440" bIns="45720" numCol="1" rtlCol="0" anchor="t" anchorCtr="0" compatLnSpc="1">
+              <a:prstTxWarp prst="textNoShape">
+                <a:avLst/>
+              </a:prstTxWarp>
+            </a:bodyPr>
+            <a:lstStyle/>
+            <a:p>
+              <a:pPr marL="0" marR="0" indent="0" algn="l" defTabSz="914400" rtl="0" eaLnBrk="0" fontAlgn="base" latinLnBrk="0" hangingPunct="0">
+                <a:lnSpc>
+                  <a:spcPct val="100000"/>
+                </a:lnSpc>
+                <a:spcBef>
+                  <a:spcPct val="0"/>
+                </a:spcBef>
+                <a:spcAft>
+                  <a:spcPct val="0"/>
+                </a:spcAft>
+                <a:buClrTx/>
+                <a:buSzTx/>
+                <a:buFontTx/>
+                <a:buNone/>
+                <a:tabLst/>
+              </a:pPr>
+              <a:endParaRPr kumimoji="0" lang="ko-KR" altLang="en-US" sz="2400" i="0" u="none" strike="noStrike" normalizeH="0" baseline="0" dirty="0">
+                <a:ln w="0">
+                  <a:noFill/>
+                </a:ln>
+                <a:solidFill>
+                  <a:schemeClr val="accent1"/>
+                </a:solidFill>
+                <a:effectLst>
+                  <a:outerShdw blurRad="38100" dist="25400" dir="5400000" algn="ctr" rotWithShape="0">
+                    <a:srgbClr val="6E747A">
+                      <a:alpha val="43000"/>
+                    </a:srgbClr>
+                  </a:outerShdw>
+                </a:effectLst>
+                <a:latin typeface="Arial" charset="0"/>
+              </a:endParaRPr>
+            </a:p>
+          </p:txBody>
+        </p:sp>
+        <p:cxnSp>
+          <p:nvCxnSpPr>
+            <p:cNvPr id="69" name="Straight Connector 68">
+              <a:extLst>
+                <a:ext uri="{FF2B5EF4-FFF2-40B4-BE49-F238E27FC236}">
+                  <a16:creationId xmlns:a16="http://schemas.microsoft.com/office/drawing/2014/main" id="{0A481B1A-B94C-4130-8C90-610B9352A16F}"/>
+                </a:ext>
+              </a:extLst>
+            </p:cNvPr>
+            <p:cNvCxnSpPr>
+              <a:cxnSpLocks/>
+            </p:cNvCxnSpPr>
+            <p:nvPr/>
+          </p:nvCxnSpPr>
+          <p:spPr bwMode="auto">
+            <a:xfrm flipV="1">
+              <a:off x="4304160" y="2276872"/>
+              <a:ext cx="0" cy="1728192"/>
+            </a:xfrm>
+            <a:prstGeom prst="line">
+              <a:avLst/>
+            </a:prstGeom>
+            <a:ln>
+              <a:headEnd type="none" w="med" len="med"/>
+              <a:tailEnd type="none" w="med" len="med"/>
+            </a:ln>
+            <a:extLst/>
+          </p:spPr>
+          <p:style>
+            <a:lnRef idx="2">
+              <a:schemeClr val="dk1"/>
+            </a:lnRef>
+            <a:fillRef idx="0">
+              <a:schemeClr val="dk1"/>
+            </a:fillRef>
+            <a:effectRef idx="1">
+              <a:schemeClr val="dk1"/>
+            </a:effectRef>
+            <a:fontRef idx="minor">
+              <a:schemeClr val="tx1"/>
+            </a:fontRef>
+          </p:style>
+        </p:cxnSp>
+        <p:sp>
+          <p:nvSpPr>
+            <p:cNvPr id="71" name="TextBox 70">
+              <a:extLst>
+                <a:ext uri="{FF2B5EF4-FFF2-40B4-BE49-F238E27FC236}">
+                  <a16:creationId xmlns:a16="http://schemas.microsoft.com/office/drawing/2014/main" id="{E0F88E1F-43A0-460E-89BC-EC9C956FC3D4}"/>
+                </a:ext>
+              </a:extLst>
+            </p:cNvPr>
+            <p:cNvSpPr txBox="1"/>
+            <p:nvPr/>
+          </p:nvSpPr>
+          <p:spPr>
+            <a:xfrm>
+              <a:off x="5943234" y="3635732"/>
+              <a:ext cx="1509086" cy="307777"/>
+            </a:xfrm>
+            <a:prstGeom prst="rect">
+              <a:avLst/>
+            </a:prstGeom>
+            <a:noFill/>
+          </p:spPr>
+          <p:txBody>
+            <a:bodyPr wrap="square" rtlCol="0">
+              <a:spAutoFit/>
+            </a:bodyPr>
+            <a:lstStyle/>
+            <a:p>
+              <a:r>
+                <a:rPr lang="en-US" altLang="ko-KR" sz="1400" dirty="0"/>
+                <a:t>Learned weights</a:t>
+              </a:r>
+              <a:endParaRPr lang="ko-KR" altLang="en-US" sz="1400" dirty="0"/>
+            </a:p>
+          </p:txBody>
+        </p:sp>
+        <p:sp>
+          <p:nvSpPr>
+            <p:cNvPr id="72" name="Arrow: Right 71">
+              <a:extLst>
+                <a:ext uri="{FF2B5EF4-FFF2-40B4-BE49-F238E27FC236}">
+                  <a16:creationId xmlns:a16="http://schemas.microsoft.com/office/drawing/2014/main" id="{0EF6FF81-8513-44B9-BA2B-DCB80218A2FD}"/>
+                </a:ext>
+              </a:extLst>
+            </p:cNvPr>
+            <p:cNvSpPr/>
+            <p:nvPr/>
+          </p:nvSpPr>
+          <p:spPr bwMode="auto">
+            <a:xfrm>
+              <a:off x="7440642" y="2865494"/>
+              <a:ext cx="288681" cy="313828"/>
+            </a:xfrm>
+            <a:prstGeom prst="rightArrow">
+              <a:avLst/>
+            </a:prstGeom>
+            <a:solidFill>
+              <a:srgbClr val="0070C0"/>
+            </a:solidFill>
+            <a:ln w="9525" cap="flat" cmpd="sng" algn="ctr">
+              <a:noFill/>
+              <a:prstDash val="solid"/>
+              <a:round/>
+              <a:headEnd type="none" w="med" len="med"/>
+              <a:tailEnd type="none" w="med" len="med"/>
+            </a:ln>
+            <a:effectLst/>
+            <a:extLst/>
+          </p:spPr>
+          <p:txBody>
+            <a:bodyPr vert="horz" wrap="square" lIns="91440" tIns="45720" rIns="91440" bIns="45720" numCol="1" rtlCol="0" anchor="t" anchorCtr="0" compatLnSpc="1">
+              <a:prstTxWarp prst="textNoShape">
+                <a:avLst/>
+              </a:prstTxWarp>
+            </a:bodyPr>
+            <a:lstStyle/>
+            <a:p>
+              <a:pPr marL="0" marR="0" indent="0" algn="l" defTabSz="914400" rtl="0" eaLnBrk="0" fontAlgn="base" latinLnBrk="0" hangingPunct="0">
+                <a:lnSpc>
+                  <a:spcPct val="100000"/>
+                </a:lnSpc>
+                <a:spcBef>
+                  <a:spcPct val="0"/>
+                </a:spcBef>
+                <a:spcAft>
+                  <a:spcPct val="0"/>
+                </a:spcAft>
+                <a:buClrTx/>
+                <a:buSzTx/>
+                <a:buFontTx/>
+                <a:buNone/>
+                <a:tabLst/>
+              </a:pPr>
+              <a:endParaRPr kumimoji="0" lang="ko-KR" altLang="en-US" sz="2400" i="0" u="none" strike="noStrike" normalizeH="0" baseline="0" dirty="0">
+                <a:ln w="0">
+                  <a:noFill/>
+                </a:ln>
+                <a:solidFill>
+                  <a:schemeClr val="accent1"/>
+                </a:solidFill>
+                <a:effectLst>
+                  <a:outerShdw blurRad="38100" dist="25400" dir="5400000" algn="ctr" rotWithShape="0">
+                    <a:srgbClr val="6E747A">
+                      <a:alpha val="43000"/>
+                    </a:srgbClr>
+                  </a:outerShdw>
+                </a:effectLst>
+                <a:latin typeface="Arial" charset="0"/>
+              </a:endParaRPr>
+            </a:p>
+          </p:txBody>
+        </p:sp>
+        <p:sp>
+          <p:nvSpPr>
+            <p:cNvPr id="73" name="Rectangle 72">
+              <a:extLst>
+                <a:ext uri="{FF2B5EF4-FFF2-40B4-BE49-F238E27FC236}">
+                  <a16:creationId xmlns:a16="http://schemas.microsoft.com/office/drawing/2014/main" id="{AFAD668A-1DF7-48D0-A061-2F96E8597FE2}"/>
+                </a:ext>
+              </a:extLst>
+            </p:cNvPr>
+            <p:cNvSpPr/>
+            <p:nvPr/>
+          </p:nvSpPr>
+          <p:spPr>
+            <a:xfrm>
+              <a:off x="7921119" y="2717283"/>
+              <a:ext cx="318055" cy="523220"/>
+            </a:xfrm>
+            <a:prstGeom prst="rect">
+              <a:avLst/>
+            </a:prstGeom>
+            <a:noFill/>
+          </p:spPr>
+          <p:txBody>
+            <a:bodyPr wrap="square" lIns="91440" tIns="45720" rIns="91440" bIns="45720">
+              <a:spAutoFit/>
+            </a:bodyPr>
+            <a:lstStyle/>
+            <a:p>
+              <a:pPr algn="ctr"/>
+              <a:r>
+                <a:rPr lang="en-US" altLang="ko-KR" sz="2800" dirty="0">
+                  <a:ln w="0"/>
+                  <a:effectLst>
+                    <a:outerShdw blurRad="38100" dist="19050" dir="2700000" algn="tl" rotWithShape="0">
+                      <a:schemeClr val="dk1">
+                        <a:alpha val="40000"/>
+                      </a:schemeClr>
+                    </a:outerShdw>
+                  </a:effectLst>
+                </a:rPr>
+                <a:t>b</a:t>
+              </a:r>
+            </a:p>
+          </p:txBody>
+        </p:sp>
+        <p:sp>
+          <p:nvSpPr>
+            <p:cNvPr id="74" name="TextBox 73">
+              <a:extLst>
+                <a:ext uri="{FF2B5EF4-FFF2-40B4-BE49-F238E27FC236}">
+                  <a16:creationId xmlns:a16="http://schemas.microsoft.com/office/drawing/2014/main" id="{75E16733-D27B-4759-8A5B-C8180E35D6AD}"/>
+                </a:ext>
+              </a:extLst>
+            </p:cNvPr>
+            <p:cNvSpPr txBox="1"/>
+            <p:nvPr/>
+          </p:nvSpPr>
+          <p:spPr>
+            <a:xfrm>
+              <a:off x="1844015" y="4139788"/>
+              <a:ext cx="639753" cy="369332"/>
+            </a:xfrm>
+            <a:prstGeom prst="rect">
+              <a:avLst/>
+            </a:prstGeom>
+            <a:noFill/>
+          </p:spPr>
+          <p:txBody>
+            <a:bodyPr wrap="square" rtlCol="0">
+              <a:spAutoFit/>
+            </a:bodyPr>
+            <a:lstStyle/>
+            <a:p>
+              <a:r>
+                <a:rPr lang="en-US" altLang="ko-KR" sz="1800" dirty="0"/>
+                <a:t>train</a:t>
+              </a:r>
+              <a:endParaRPr lang="ko-KR" altLang="en-US" sz="1800" dirty="0"/>
+            </a:p>
+          </p:txBody>
+        </p:sp>
+        <p:sp>
+          <p:nvSpPr>
+            <p:cNvPr id="75" name="TextBox 74">
+              <a:extLst>
+                <a:ext uri="{FF2B5EF4-FFF2-40B4-BE49-F238E27FC236}">
+                  <a16:creationId xmlns:a16="http://schemas.microsoft.com/office/drawing/2014/main" id="{4C4248E9-6071-45DB-8CAA-F31B0341AAE5}"/>
+                </a:ext>
+              </a:extLst>
+            </p:cNvPr>
+            <p:cNvSpPr txBox="1"/>
+            <p:nvPr/>
+          </p:nvSpPr>
+          <p:spPr>
+            <a:xfrm>
+              <a:off x="6296184" y="4139788"/>
+              <a:ext cx="923779" cy="369332"/>
+            </a:xfrm>
+            <a:prstGeom prst="rect">
+              <a:avLst/>
+            </a:prstGeom>
+            <a:noFill/>
+          </p:spPr>
+          <p:txBody>
+            <a:bodyPr wrap="square" rtlCol="0">
+              <a:spAutoFit/>
+            </a:bodyPr>
+            <a:lstStyle/>
+            <a:p>
+              <a:r>
+                <a:rPr lang="en-US" altLang="ko-KR" sz="1800" dirty="0"/>
+                <a:t>predict</a:t>
+              </a:r>
+              <a:endParaRPr lang="ko-KR" altLang="en-US" sz="1800" dirty="0"/>
+            </a:p>
+          </p:txBody>
+        </p:sp>
+      </p:grpSp>
     </p:spTree>
     <p:extLst>
       <p:ext uri="{BB962C8B-B14F-4D97-AF65-F5344CB8AC3E}">
@@ -6103,7 +7515,7 @@
             <a:fld id="{23AE0199-44D3-47D6-B4EF-C96D573ED5FB}" type="datetime4">
               <a:rPr lang="de-CH" smtClean="0"/>
               <a:pPr/>
-              <a:t>16. Mai 2019</a:t>
+              <a:t>18. Mai 2019</a:t>
             </a:fld>
             <a:endParaRPr lang="de-CH">
               <a:solidFill>
@@ -6178,6 +7590,62 @@
           </a:p>
           <a:p>
             <a:endParaRPr lang="en-US" altLang="ko-KR" dirty="0"/>
+          </a:p>
+        </p:txBody>
+      </p:sp>
+      <p:sp>
+        <p:nvSpPr>
+          <p:cNvPr id="3" name="TextBox 2">
+            <a:extLst>
+              <a:ext uri="{FF2B5EF4-FFF2-40B4-BE49-F238E27FC236}">
+                <a16:creationId xmlns:a16="http://schemas.microsoft.com/office/drawing/2014/main" id="{1B6A9387-9769-4E86-8883-C335AB3AE968}"/>
+              </a:ext>
+            </a:extLst>
+          </p:cNvPr>
+          <p:cNvSpPr txBox="1"/>
+          <p:nvPr/>
+        </p:nvSpPr>
+        <p:spPr>
+          <a:xfrm>
+            <a:off x="539552" y="2939460"/>
+            <a:ext cx="8136904" cy="1569660"/>
+          </a:xfrm>
+          <a:prstGeom prst="rect">
+            <a:avLst/>
+          </a:prstGeom>
+          <a:noFill/>
+        </p:spPr>
+        <p:txBody>
+          <a:bodyPr wrap="square" rtlCol="0">
+            <a:spAutoFit/>
+          </a:bodyPr>
+          <a:lstStyle/>
+          <a:p>
+            <a:r>
+              <a:rPr lang="en-US" altLang="ko-KR" dirty="0">
+                <a:latin typeface="Bauhaus 93" panose="04030905020B02020C02" pitchFamily="82" charset="0"/>
+              </a:rPr>
+              <a:t>∙ </a:t>
+            </a:r>
+            <a:r>
+              <a:rPr lang="en-US" altLang="ko-KR" dirty="0"/>
+              <a:t>Need for a sign language detection system</a:t>
+            </a:r>
+          </a:p>
+          <a:p>
+            <a:endParaRPr lang="en-US" altLang="ko-KR" dirty="0"/>
+          </a:p>
+          <a:p>
+            <a:r>
+              <a:rPr lang="en-US" altLang="ko-KR" dirty="0"/>
+              <a:t>    - functions as a universal language</a:t>
+            </a:r>
+          </a:p>
+          <a:p>
+            <a:r>
+              <a:rPr lang="en-US" altLang="ko-KR" dirty="0"/>
+              <a:t>    - difficult to memorize all the hand poses and gestures</a:t>
+            </a:r>
           </a:p>
         </p:txBody>
       </p:sp>
@@ -6242,31 +7710,6 @@
       </p:sp>
       <p:sp>
         <p:nvSpPr>
-          <p:cNvPr id="3" name="Content Placeholder 2">
-            <a:extLst>
-              <a:ext uri="{FF2B5EF4-FFF2-40B4-BE49-F238E27FC236}">
-                <a16:creationId xmlns:a16="http://schemas.microsoft.com/office/drawing/2014/main" id="{857A32CB-CFDB-4E0D-B628-68B34532E3C8}"/>
-              </a:ext>
-            </a:extLst>
-          </p:cNvPr>
-          <p:cNvSpPr>
-            <a:spLocks noGrp="1"/>
-          </p:cNvSpPr>
-          <p:nvPr>
-            <p:ph idx="1"/>
-          </p:nvPr>
-        </p:nvSpPr>
-        <p:spPr/>
-        <p:txBody>
-          <a:bodyPr/>
-          <a:lstStyle/>
-          <a:p>
-            <a:endParaRPr lang="ko-KR" altLang="en-US"/>
-          </a:p>
-        </p:txBody>
-      </p:sp>
-      <p:sp>
-        <p:nvSpPr>
           <p:cNvPr id="4" name="Date Placeholder 3">
             <a:extLst>
               <a:ext uri="{FF2B5EF4-FFF2-40B4-BE49-F238E27FC236}">
@@ -6289,7 +7732,7 @@
             <a:fld id="{23AE0199-44D3-47D6-B4EF-C96D573ED5FB}" type="datetime4">
               <a:rPr lang="de-CH" smtClean="0"/>
               <a:pPr/>
-              <a:t>16. Mai 2019</a:t>
+              <a:t>18. Mai 2019</a:t>
             </a:fld>
             <a:endParaRPr lang="de-CH">
               <a:solidFill>
@@ -6326,6 +7769,106 @@
               <a:t>4</a:t>
             </a:fld>
             <a:endParaRPr lang="de-CH"/>
+          </a:p>
+        </p:txBody>
+      </p:sp>
+      <p:sp>
+        <p:nvSpPr>
+          <p:cNvPr id="5" name="TextBox 4">
+            <a:extLst>
+              <a:ext uri="{FF2B5EF4-FFF2-40B4-BE49-F238E27FC236}">
+                <a16:creationId xmlns:a16="http://schemas.microsoft.com/office/drawing/2014/main" id="{65FE3E11-02E6-4D89-BD7D-9E89182B4606}"/>
+              </a:ext>
+            </a:extLst>
+          </p:cNvPr>
+          <p:cNvSpPr txBox="1"/>
+          <p:nvPr/>
+        </p:nvSpPr>
+        <p:spPr>
+          <a:xfrm>
+            <a:off x="483766" y="2363396"/>
+            <a:ext cx="6984578" cy="1569660"/>
+          </a:xfrm>
+          <a:prstGeom prst="rect">
+            <a:avLst/>
+          </a:prstGeom>
+          <a:noFill/>
+        </p:spPr>
+        <p:txBody>
+          <a:bodyPr wrap="square" rtlCol="0">
+            <a:spAutoFit/>
+          </a:bodyPr>
+          <a:lstStyle/>
+          <a:p>
+            <a:pPr marL="457200" indent="-457200">
+              <a:buAutoNum type="arabicParenR"/>
+            </a:pPr>
+            <a:r>
+              <a:rPr lang="en-US" altLang="ko-KR" dirty="0"/>
+              <a:t>Limited dataset</a:t>
+            </a:r>
+          </a:p>
+          <a:p>
+            <a:endParaRPr lang="en-US" altLang="ko-KR" dirty="0"/>
+          </a:p>
+          <a:p>
+            <a:pPr marL="457200" indent="-457200">
+              <a:buAutoNum type="arabicParenR"/>
+            </a:pPr>
+            <a:endParaRPr lang="en-US" altLang="ko-KR" dirty="0"/>
+          </a:p>
+          <a:p>
+            <a:endParaRPr lang="en-US" altLang="ko-KR" dirty="0"/>
+          </a:p>
+        </p:txBody>
+      </p:sp>
+      <p:sp>
+        <p:nvSpPr>
+          <p:cNvPr id="7" name="TextBox 6">
+            <a:extLst>
+              <a:ext uri="{FF2B5EF4-FFF2-40B4-BE49-F238E27FC236}">
+                <a16:creationId xmlns:a16="http://schemas.microsoft.com/office/drawing/2014/main" id="{B0A8BA29-6D13-4BEE-AF25-6710378E1038}"/>
+              </a:ext>
+            </a:extLst>
+          </p:cNvPr>
+          <p:cNvSpPr txBox="1"/>
+          <p:nvPr/>
+        </p:nvSpPr>
+        <p:spPr>
+          <a:xfrm>
+            <a:off x="467544" y="4077072"/>
+            <a:ext cx="6984578" cy="1569660"/>
+          </a:xfrm>
+          <a:prstGeom prst="rect">
+            <a:avLst/>
+          </a:prstGeom>
+          <a:noFill/>
+        </p:spPr>
+        <p:txBody>
+          <a:bodyPr wrap="square" rtlCol="0">
+            <a:spAutoFit/>
+          </a:bodyPr>
+          <a:lstStyle/>
+          <a:p>
+            <a:r>
+              <a:rPr lang="en-US" altLang="ko-KR" dirty="0"/>
+              <a:t>2)  No depth Information</a:t>
+            </a:r>
+          </a:p>
+          <a:p>
+            <a:r>
+              <a:rPr lang="en-US" altLang="ko-KR" dirty="0"/>
+              <a:t>       - no motion , could not train j and z</a:t>
+            </a:r>
+          </a:p>
+          <a:p>
+            <a:pPr marL="457200" indent="-457200">
+              <a:buAutoNum type="arabicParenR"/>
+            </a:pPr>
+            <a:endParaRPr lang="en-US" altLang="ko-KR" dirty="0"/>
+          </a:p>
+          <a:p>
+            <a:endParaRPr lang="en-US" altLang="ko-KR" dirty="0"/>
           </a:p>
         </p:txBody>
       </p:sp>
@@ -6412,7 +7955,7 @@
             <a:fld id="{23AE0199-44D3-47D6-B4EF-C96D573ED5FB}" type="datetime4">
               <a:rPr lang="de-CH" smtClean="0"/>
               <a:pPr/>
-              <a:t>16. Mai 2019</a:t>
+              <a:t>18. Mai 2019</a:t>
             </a:fld>
             <a:endParaRPr lang="de-CH">
               <a:solidFill>
@@ -6596,7 +8139,7 @@
             <a:fld id="{23AE0199-44D3-47D6-B4EF-C96D573ED5FB}" type="datetime4">
               <a:rPr lang="de-CH" smtClean="0"/>
               <a:pPr/>
-              <a:t>16. Mai 2019</a:t>
+              <a:t>18. Mai 2019</a:t>
             </a:fld>
             <a:endParaRPr lang="de-CH">
               <a:solidFill>
@@ -6744,7 +8287,7 @@
             <a:fld id="{23AE0199-44D3-47D6-B4EF-C96D573ED5FB}" type="datetime4">
               <a:rPr lang="de-CH" smtClean="0"/>
               <a:pPr/>
-              <a:t>16. Mai 2019</a:t>
+              <a:t>18. Mai 2019</a:t>
             </a:fld>
             <a:endParaRPr lang="de-CH">
               <a:solidFill>
@@ -6892,7 +8435,7 @@
             <a:fld id="{23AE0199-44D3-47D6-B4EF-C96D573ED5FB}" type="datetime4">
               <a:rPr lang="de-CH" smtClean="0"/>
               <a:pPr/>
-              <a:t>16. Mai 2019</a:t>
+              <a:t>18. Mai 2019</a:t>
             </a:fld>
             <a:endParaRPr lang="de-CH">
               <a:solidFill>
@@ -7040,7 +8583,7 @@
             <a:fld id="{23AE0199-44D3-47D6-B4EF-C96D573ED5FB}" type="datetime4">
               <a:rPr lang="de-CH" smtClean="0"/>
               <a:pPr/>
-              <a:t>16. Mai 2019</a:t>
+              <a:t>18. Mai 2019</a:t>
             </a:fld>
             <a:endParaRPr lang="de-CH">
               <a:solidFill>

</xml_diff>

<commit_message>
added some changes to presentation
</commit_message>
<xml_diff>
--- a/ATML_presentation.pptx
+++ b/ATML_presentation.pptx
@@ -8465,7 +8465,7 @@
         <p:spPr>
           <a:xfrm>
             <a:off x="323528" y="2060848"/>
-            <a:ext cx="7632848" cy="4154984"/>
+            <a:ext cx="7632848" cy="4524315"/>
           </a:xfrm>
           <a:prstGeom prst="rect">
             <a:avLst/>
@@ -8518,19 +8518,26 @@
             <a:endParaRPr lang="en-US" altLang="ko-KR" dirty="0"/>
           </a:p>
           <a:p>
-            <a:pPr marL="457200" indent="-457200">
-              <a:buAutoNum type="arabicParenR"/>
-            </a:pPr>
             <a:r>
               <a:rPr lang="en-US" altLang="ko-KR" dirty="0"/>
-              <a:t>Two different datasets for the test</a:t>
-            </a:r>
-          </a:p>
-          <a:p>
-            <a:pPr marL="457200" indent="-457200">
-              <a:buAutoNum type="arabicParenR"/>
-            </a:pPr>
-            <a:endParaRPr lang="en-US" altLang="ko-KR" dirty="0"/>
+              <a:t>2)  Two different datasets for the test</a:t>
+            </a:r>
+          </a:p>
+          <a:p>
+            <a:r>
+              <a:rPr lang="en-US" altLang="ko-KR"/>
+              <a:t>        “Finger </a:t>
+            </a:r>
+            <a:r>
+              <a:rPr lang="en-US" altLang="ko-KR" dirty="0"/>
+              <a:t>spelling” dataset</a:t>
+            </a:r>
+          </a:p>
+          <a:p>
+            <a:r>
+              <a:rPr lang="en-US" altLang="ko-KR" dirty="0"/>
+              <a:t>        “Kaggle” dataset</a:t>
+            </a:r>
           </a:p>
           <a:p>
             <a:endParaRPr lang="en-US" altLang="ko-KR" dirty="0"/>

</xml_diff>

<commit_message>
added animation to slide 9
</commit_message>
<xml_diff>
--- a/ATML_presentation.pptx
+++ b/ATML_presentation.pptx
@@ -468,7 +468,7 @@
             <a:fld id="{CF110CB4-791D-4D73-82DE-F3300A775DAD}" type="slidenum">
               <a:rPr lang="de-CH"/>
               <a:pPr/>
-              <a:t>‹Nr.›</a:t>
+              <a:t>‹#›</a:t>
             </a:fld>
             <a:endParaRPr lang="de-CH"/>
           </a:p>
@@ -921,7 +921,7 @@
             <a:fld id="{04A51B89-CABC-45B5-B711-980681E2ED72}" type="slidenum">
               <a:rPr lang="de-CH"/>
               <a:pPr/>
-              <a:t>‹Nr.›</a:t>
+              <a:t>‹#›</a:t>
             </a:fld>
             <a:endParaRPr lang="de-CH"/>
           </a:p>
@@ -1523,7 +1523,7 @@
             <a:fld id="{E8C82DAF-DEAF-4EA7-BE55-7E6CDD26CF99}" type="datetime4">
               <a:rPr lang="de-CH"/>
               <a:pPr/>
-              <a:t>18. Mai 2019</a:t>
+              <a:t>20. Mai 2019</a:t>
             </a:fld>
             <a:endParaRPr lang="de-CH"/>
           </a:p>
@@ -1587,7 +1587,7 @@
             <a:fld id="{0FA23137-8AB5-492B-A26F-2C7E38032BB6}" type="slidenum">
               <a:rPr lang="de-CH"/>
               <a:pPr/>
-              <a:t>‹Nr.›</a:t>
+              <a:t>‹#›</a:t>
             </a:fld>
             <a:endParaRPr lang="de-CH"/>
           </a:p>
@@ -1756,7 +1756,7 @@
             <a:fld id="{E2714782-A64D-405C-BA5A-445680FA327E}" type="datetime4">
               <a:rPr lang="de-CH"/>
               <a:pPr/>
-              <a:t>18. Mai 2019</a:t>
+              <a:t>20. Mai 2019</a:t>
             </a:fld>
             <a:endParaRPr lang="de-CH">
               <a:solidFill>
@@ -1814,7 +1814,7 @@
             <a:fld id="{A7C979AF-FB10-41AA-A0F7-7145D14321FF}" type="slidenum">
               <a:rPr lang="de-CH"/>
               <a:pPr/>
-              <a:t>‹Nr.›</a:t>
+              <a:t>‹#›</a:t>
             </a:fld>
             <a:endParaRPr lang="de-CH"/>
           </a:p>
@@ -1957,7 +1957,7 @@
             <a:fld id="{40BC2B19-3086-4B40-BD00-D6229B6DD532}" type="datetime4">
               <a:rPr lang="de-CH"/>
               <a:pPr/>
-              <a:t>18. Mai 2019</a:t>
+              <a:t>20. Mai 2019</a:t>
             </a:fld>
             <a:endParaRPr lang="de-CH">
               <a:solidFill>
@@ -2015,7 +2015,7 @@
             <a:fld id="{84311057-1CF0-4B56-8E39-F4D8C0B74A6E}" type="slidenum">
               <a:rPr lang="de-CH"/>
               <a:pPr/>
-              <a:t>‹Nr.›</a:t>
+              <a:t>‹#›</a:t>
             </a:fld>
             <a:endParaRPr lang="de-CH"/>
           </a:p>
@@ -2148,7 +2148,7 @@
             <a:fld id="{23AE0199-44D3-47D6-B4EF-C96D573ED5FB}" type="datetime4">
               <a:rPr lang="de-CH"/>
               <a:pPr/>
-              <a:t>18. Mai 2019</a:t>
+              <a:t>20. Mai 2019</a:t>
             </a:fld>
             <a:endParaRPr lang="de-CH">
               <a:solidFill>
@@ -2206,7 +2206,7 @@
             <a:fld id="{3D6ED8A1-37C3-4579-98E8-A9E8D86396A5}" type="slidenum">
               <a:rPr lang="de-CH"/>
               <a:pPr/>
-              <a:t>‹Nr.›</a:t>
+              <a:t>‹#›</a:t>
             </a:fld>
             <a:endParaRPr lang="de-CH"/>
           </a:p>
@@ -2361,7 +2361,7 @@
             <a:fld id="{F96FA47B-E7C1-497B-8FFE-788BFF4EFC11}" type="datetime4">
               <a:rPr lang="de-CH"/>
               <a:pPr/>
-              <a:t>18. Mai 2019</a:t>
+              <a:t>20. Mai 2019</a:t>
             </a:fld>
             <a:endParaRPr lang="de-CH">
               <a:solidFill>
@@ -2419,7 +2419,7 @@
             <a:fld id="{A42C61A4-63F0-4A9B-BC7E-5956E1A009F3}" type="slidenum">
               <a:rPr lang="de-CH"/>
               <a:pPr/>
-              <a:t>‹Nr.›</a:t>
+              <a:t>‹#›</a:t>
             </a:fld>
             <a:endParaRPr lang="de-CH"/>
           </a:p>
@@ -2670,7 +2670,7 @@
             <a:fld id="{DC2001ED-48E2-473D-9391-0CC2286E4E04}" type="datetime4">
               <a:rPr lang="de-CH"/>
               <a:pPr/>
-              <a:t>18. Mai 2019</a:t>
+              <a:t>20. Mai 2019</a:t>
             </a:fld>
             <a:endParaRPr lang="de-CH">
               <a:solidFill>
@@ -2728,7 +2728,7 @@
             <a:fld id="{576385C3-62BC-4687-8A3A-C6CD0FEED2F0}" type="slidenum">
               <a:rPr lang="de-CH"/>
               <a:pPr/>
-              <a:t>‹Nr.›</a:t>
+              <a:t>‹#›</a:t>
             </a:fld>
             <a:endParaRPr lang="de-CH"/>
           </a:p>
@@ -3118,7 +3118,7 @@
             <a:fld id="{06D2EBEC-D335-4891-8EE2-E5F19A2114DA}" type="datetime4">
               <a:rPr lang="de-CH"/>
               <a:pPr/>
-              <a:t>18. Mai 2019</a:t>
+              <a:t>20. Mai 2019</a:t>
             </a:fld>
             <a:endParaRPr lang="de-CH">
               <a:solidFill>
@@ -3176,7 +3176,7 @@
             <a:fld id="{A0118724-4A6D-4D4F-8086-F1584E08094B}" type="slidenum">
               <a:rPr lang="de-CH"/>
               <a:pPr/>
-              <a:t>‹Nr.›</a:t>
+              <a:t>‹#›</a:t>
             </a:fld>
             <a:endParaRPr lang="de-CH"/>
           </a:p>
@@ -3257,7 +3257,7 @@
             <a:fld id="{BC375444-A4CE-4AEE-A7EE-DA682EFEECCF}" type="datetime4">
               <a:rPr lang="de-CH"/>
               <a:pPr/>
-              <a:t>18. Mai 2019</a:t>
+              <a:t>20. Mai 2019</a:t>
             </a:fld>
             <a:endParaRPr lang="de-CH">
               <a:solidFill>
@@ -3315,7 +3315,7 @@
             <a:fld id="{44991074-D27D-4C96-A136-2196CA043B12}" type="slidenum">
               <a:rPr lang="de-CH"/>
               <a:pPr/>
-              <a:t>‹Nr.›</a:t>
+              <a:t>‹#›</a:t>
             </a:fld>
             <a:endParaRPr lang="de-CH"/>
           </a:p>
@@ -3373,7 +3373,7 @@
             <a:fld id="{04EE424D-A955-4F62-8B7E-6EF8C8430D57}" type="datetime4">
               <a:rPr lang="de-CH"/>
               <a:pPr/>
-              <a:t>18. Mai 2019</a:t>
+              <a:t>20. Mai 2019</a:t>
             </a:fld>
             <a:endParaRPr lang="de-CH">
               <a:solidFill>
@@ -3431,7 +3431,7 @@
             <a:fld id="{CFEC23FD-0CFB-49B2-87B0-BE605FE963F0}" type="slidenum">
               <a:rPr lang="de-CH"/>
               <a:pPr/>
-              <a:t>‹Nr.›</a:t>
+              <a:t>‹#›</a:t>
             </a:fld>
             <a:endParaRPr lang="de-CH"/>
           </a:p>
@@ -3671,7 +3671,7 @@
             <a:fld id="{BE7B0FEC-82BA-44DB-802E-8D67E43E9D46}" type="datetime4">
               <a:rPr lang="de-CH"/>
               <a:pPr/>
-              <a:t>18. Mai 2019</a:t>
+              <a:t>20. Mai 2019</a:t>
             </a:fld>
             <a:endParaRPr lang="de-CH">
               <a:solidFill>
@@ -3729,7 +3729,7 @@
             <a:fld id="{502201E4-85BB-4B0E-BEB7-39EEB1DD783F}" type="slidenum">
               <a:rPr lang="de-CH"/>
               <a:pPr/>
-              <a:t>‹Nr.›</a:t>
+              <a:t>‹#›</a:t>
             </a:fld>
             <a:endParaRPr lang="de-CH"/>
           </a:p>
@@ -3949,7 +3949,7 @@
             <a:fld id="{55C4310E-AA52-45A7-B65B-092449D821B1}" type="datetime4">
               <a:rPr lang="de-CH"/>
               <a:pPr/>
-              <a:t>18. Mai 2019</a:t>
+              <a:t>20. Mai 2019</a:t>
             </a:fld>
             <a:endParaRPr lang="de-CH">
               <a:solidFill>
@@ -4007,7 +4007,7 @@
             <a:fld id="{75D519C1-6294-4B3A-9F72-D91BCFBC54C5}" type="slidenum">
               <a:rPr lang="de-CH"/>
               <a:pPr/>
-              <a:t>‹Nr.›</a:t>
+              <a:t>‹#›</a:t>
             </a:fld>
             <a:endParaRPr lang="de-CH"/>
           </a:p>
@@ -4393,7 +4393,7 @@
             <a:fld id="{982E0833-EC79-451B-98E6-FF7F74C6A782}" type="datetime4">
               <a:rPr lang="de-CH"/>
               <a:pPr/>
-              <a:t>18. Mai 2019</a:t>
+              <a:t>20. Mai 2019</a:t>
             </a:fld>
             <a:endParaRPr lang="de-CH">
               <a:solidFill>
@@ -4541,7 +4541,7 @@
             <a:fld id="{31266581-0159-4A87-A1D2-ABFAB9B353D3}" type="slidenum">
               <a:rPr lang="de-CH"/>
               <a:pPr/>
-              <a:t>‹Nr.›</a:t>
+              <a:t>‹#›</a:t>
             </a:fld>
             <a:endParaRPr lang="de-CH"/>
           </a:p>
@@ -5104,7 +5104,7 @@
             <a:fld id="{23AE0199-44D3-47D6-B4EF-C96D573ED5FB}" type="datetime4">
               <a:rPr lang="de-CH" smtClean="0"/>
               <a:pPr/>
-              <a:t>18. Mai 2019</a:t>
+              <a:t>20. Mai 2019</a:t>
             </a:fld>
             <a:endParaRPr lang="de-CH">
               <a:solidFill>
@@ -5829,7 +5829,7 @@
             <a:fld id="{23AE0199-44D3-47D6-B4EF-C96D573ED5FB}" type="datetime4">
               <a:rPr lang="de-CH" smtClean="0"/>
               <a:pPr/>
-              <a:t>18. Mai 2019</a:t>
+              <a:t>20. Mai 2019</a:t>
             </a:fld>
             <a:endParaRPr lang="de-CH">
               <a:solidFill>
@@ -5965,6 +5965,24 @@
             <a:pPr marL="0" indent="0">
               <a:buNone/>
             </a:pPr>
+            <a:endParaRPr lang="en-US" altLang="ko-KR" sz="1800" dirty="0"/>
+          </a:p>
+          <a:p>
+            <a:pPr marL="0" indent="0">
+              <a:buNone/>
+            </a:pPr>
+            <a:endParaRPr lang="en-US" altLang="ko-KR" sz="1800" dirty="0"/>
+          </a:p>
+          <a:p>
+            <a:pPr marL="0" indent="0">
+              <a:buNone/>
+            </a:pPr>
+            <a:endParaRPr lang="en-US" altLang="ko-KR" sz="1800" dirty="0"/>
+          </a:p>
+          <a:p>
+            <a:pPr marL="0" indent="0">
+              <a:buNone/>
+            </a:pPr>
             <a:endParaRPr lang="ko-KR" altLang="en-US" sz="1800" dirty="0"/>
           </a:p>
         </p:txBody>
@@ -5993,7 +6011,7 @@
             <a:fld id="{23AE0199-44D3-47D6-B4EF-C96D573ED5FB}" type="datetime4">
               <a:rPr lang="de-CH" smtClean="0"/>
               <a:pPr/>
-              <a:t>18. Mai 2019</a:t>
+              <a:t>20. Mai 2019</a:t>
             </a:fld>
             <a:endParaRPr lang="de-CH">
               <a:solidFill>
@@ -6087,7 +6105,7 @@
             <a:fld id="{23AE0199-44D3-47D6-B4EF-C96D573ED5FB}" type="datetime4">
               <a:rPr lang="de-CH" smtClean="0"/>
               <a:pPr/>
-              <a:t>18. Mai 2019</a:t>
+              <a:t>20. Mai 2019</a:t>
             </a:fld>
             <a:endParaRPr lang="de-CH">
               <a:solidFill>
@@ -7515,7 +7533,7 @@
             <a:fld id="{23AE0199-44D3-47D6-B4EF-C96D573ED5FB}" type="datetime4">
               <a:rPr lang="de-CH" smtClean="0"/>
               <a:pPr/>
-              <a:t>18. Mai 2019</a:t>
+              <a:t>20. Mai 2019</a:t>
             </a:fld>
             <a:endParaRPr lang="de-CH">
               <a:solidFill>
@@ -7732,7 +7750,7 @@
             <a:fld id="{23AE0199-44D3-47D6-B4EF-C96D573ED5FB}" type="datetime4">
               <a:rPr lang="de-CH" smtClean="0"/>
               <a:pPr/>
-              <a:t>18. Mai 2019</a:t>
+              <a:t>20. Mai 2019</a:t>
             </a:fld>
             <a:endParaRPr lang="de-CH">
               <a:solidFill>
@@ -7786,7 +7804,7 @@
         </p:nvSpPr>
         <p:spPr>
           <a:xfrm>
-            <a:off x="483766" y="2363396"/>
+            <a:off x="483766" y="2348880"/>
             <a:ext cx="6984578" cy="1569660"/>
           </a:xfrm>
           <a:prstGeom prst="rect">
@@ -7836,7 +7854,7 @@
         </p:nvSpPr>
         <p:spPr>
           <a:xfrm>
-            <a:off x="467544" y="4077072"/>
+            <a:off x="467544" y="4149080"/>
             <a:ext cx="6984578" cy="1569660"/>
           </a:xfrm>
           <a:prstGeom prst="rect">
@@ -7959,7 +7977,7 @@
             <a:fld id="{23AE0199-44D3-47D6-B4EF-C96D573ED5FB}" type="datetime4">
               <a:rPr lang="de-CH" smtClean="0"/>
               <a:pPr/>
-              <a:t>18. Mai 2019</a:t>
+              <a:t>20. Mai 2019</a:t>
             </a:fld>
             <a:endParaRPr lang="de-CH">
               <a:solidFill>
@@ -8420,7 +8438,7 @@
             <a:fld id="{23AE0199-44D3-47D6-B4EF-C96D573ED5FB}" type="datetime4">
               <a:rPr lang="de-CH" smtClean="0"/>
               <a:pPr/>
-              <a:t>18. Mai 2019</a:t>
+              <a:t>20. Mai 2019</a:t>
             </a:fld>
             <a:endParaRPr lang="de-CH">
               <a:solidFill>
@@ -8579,7 +8597,7 @@
             <a:fld id="{23AE0199-44D3-47D6-B4EF-C96D573ED5FB}" type="datetime4">
               <a:rPr lang="de-CH" smtClean="0"/>
               <a:pPr/>
-              <a:t>18. Mai 2019</a:t>
+              <a:t>20. Mai 2019</a:t>
             </a:fld>
             <a:endParaRPr lang="de-CH">
               <a:solidFill>
@@ -8806,7 +8824,7 @@
             <a:fld id="{23AE0199-44D3-47D6-B4EF-C96D573ED5FB}" type="datetime4">
               <a:rPr lang="de-CH" smtClean="0"/>
               <a:pPr/>
-              <a:t>18. Mai 2019</a:t>
+              <a:t>20. Mai 2019</a:t>
             </a:fld>
             <a:endParaRPr lang="de-CH">
               <a:solidFill>
@@ -9032,7 +9050,7 @@
             <a:fld id="{23AE0199-44D3-47D6-B4EF-C96D573ED5FB}" type="datetime4">
               <a:rPr lang="de-CH" smtClean="0"/>
               <a:pPr/>
-              <a:t>18. Mai 2019</a:t>
+              <a:t>20. Mai 2019</a:t>
             </a:fld>
             <a:endParaRPr lang="de-CH">
               <a:solidFill>
@@ -9116,11 +9134,17 @@
           <p:cNvGraphicFramePr>
             <a:graphicFrameLocks noGrp="1"/>
           </p:cNvGraphicFramePr>
-          <p:nvPr/>
+          <p:nvPr>
+            <p:extLst>
+              <p:ext uri="{D42A27DB-BD31-4B8C-83A1-F6EECF244321}">
+                <p14:modId xmlns:p14="http://schemas.microsoft.com/office/powerpoint/2010/main" val="904311017"/>
+              </p:ext>
+            </p:extLst>
+          </p:nvPr>
         </p:nvGraphicFramePr>
         <p:xfrm>
-          <a:off x="179513" y="2152774"/>
-          <a:ext cx="3600399" cy="1620520"/>
+          <a:off x="2699792" y="2218863"/>
+          <a:ext cx="4071142" cy="1498169"/>
         </p:xfrm>
         <a:graphic>
           <a:graphicData uri="http://schemas.openxmlformats.org/drawingml/2006/table">
@@ -9129,21 +9153,21 @@
                 <a:tableStyleId>{073A0DAA-6AF3-43AB-8588-CEC1D06C72B9}</a:tableStyleId>
               </a:tblPr>
               <a:tblGrid>
-                <a:gridCol w="1296144">
+                <a:gridCol w="1565822">
                   <a:extLst>
                     <a:ext uri="{9D8B030D-6E8A-4147-A177-3AD203B41FA5}">
                       <a16:colId xmlns:a16="http://schemas.microsoft.com/office/drawing/2014/main" val="4077253036"/>
                     </a:ext>
                   </a:extLst>
                 </a:gridCol>
-                <a:gridCol w="1152128">
+                <a:gridCol w="1252659">
                   <a:extLst>
                     <a:ext uri="{9D8B030D-6E8A-4147-A177-3AD203B41FA5}">
                       <a16:colId xmlns:a16="http://schemas.microsoft.com/office/drawing/2014/main" val="1373654776"/>
                     </a:ext>
                   </a:extLst>
                 </a:gridCol>
-                <a:gridCol w="1152127">
+                <a:gridCol w="1252661">
                   <a:extLst>
                     <a:ext uri="{9D8B030D-6E8A-4147-A177-3AD203B41FA5}">
                       <a16:colId xmlns:a16="http://schemas.microsoft.com/office/drawing/2014/main" val="3982327588"/>
@@ -9151,7 +9175,7 @@
                   </a:extLst>
                 </a:gridCol>
               </a:tblGrid>
-              <a:tr h="0">
+              <a:tr h="512463">
                 <a:tc>
                   <a:txBody>
                     <a:bodyPr/>
@@ -9206,7 +9230,7 @@
                   </a:ext>
                 </a:extLst>
               </a:tr>
-              <a:tr h="370840">
+              <a:tr h="461849">
                 <a:tc>
                   <a:txBody>
                     <a:bodyPr/>
@@ -9258,7 +9282,7 @@
                   </a:ext>
                 </a:extLst>
               </a:tr>
-              <a:tr h="370840">
+              <a:tr h="512463">
                 <a:tc>
                   <a:txBody>
                     <a:bodyPr/>
@@ -9284,6 +9308,10 @@
                     <a:lstStyle/>
                     <a:p>
                       <a:pPr latinLnBrk="1"/>
+                      <a:r>
+                        <a:rPr lang="en-US" altLang="ko-KR" sz="1400" dirty="0"/>
+                        <a:t>50.3439</a:t>
+                      </a:r>
                       <a:endParaRPr lang="ko-KR" altLang="en-US" sz="1400" dirty="0"/>
                     </a:p>
                   </a:txBody>
@@ -9295,6 +9323,10 @@
                     <a:lstStyle/>
                     <a:p>
                       <a:pPr latinLnBrk="1"/>
+                      <a:r>
+                        <a:rPr lang="en-US" altLang="ko-KR" sz="1400" dirty="0"/>
+                        <a:t>94.2264</a:t>
+                      </a:r>
                       <a:endParaRPr lang="ko-KR" altLang="en-US" sz="1400" dirty="0"/>
                     </a:p>
                   </a:txBody>
@@ -9322,11 +9354,17 @@
           <p:cNvGraphicFramePr>
             <a:graphicFrameLocks noGrp="1"/>
           </p:cNvGraphicFramePr>
-          <p:nvPr/>
+          <p:nvPr>
+            <p:extLst>
+              <p:ext uri="{D42A27DB-BD31-4B8C-83A1-F6EECF244321}">
+                <p14:modId xmlns:p14="http://schemas.microsoft.com/office/powerpoint/2010/main" val="2450563911"/>
+              </p:ext>
+            </p:extLst>
+          </p:nvPr>
         </p:nvGraphicFramePr>
         <p:xfrm>
-          <a:off x="179512" y="4437112"/>
-          <a:ext cx="3600399" cy="1658469"/>
+          <a:off x="2699792" y="4553382"/>
+          <a:ext cx="4071142" cy="1459315"/>
         </p:xfrm>
         <a:graphic>
           <a:graphicData uri="http://schemas.openxmlformats.org/drawingml/2006/table">
@@ -9335,21 +9373,21 @@
                 <a:tableStyleId>{073A0DAA-6AF3-43AB-8588-CEC1D06C72B9}</a:tableStyleId>
               </a:tblPr>
               <a:tblGrid>
-                <a:gridCol w="1314431">
+                <a:gridCol w="1565823">
                   <a:extLst>
                     <a:ext uri="{9D8B030D-6E8A-4147-A177-3AD203B41FA5}">
                       <a16:colId xmlns:a16="http://schemas.microsoft.com/office/drawing/2014/main" val="4077253036"/>
                     </a:ext>
                   </a:extLst>
                 </a:gridCol>
-                <a:gridCol w="1142984">
+                <a:gridCol w="1148270">
                   <a:extLst>
                     <a:ext uri="{9D8B030D-6E8A-4147-A177-3AD203B41FA5}">
                       <a16:colId xmlns:a16="http://schemas.microsoft.com/office/drawing/2014/main" val="1373654776"/>
                     </a:ext>
                   </a:extLst>
                 </a:gridCol>
-                <a:gridCol w="1142984">
+                <a:gridCol w="1357049">
                   <a:extLst>
                     <a:ext uri="{9D8B030D-6E8A-4147-A177-3AD203B41FA5}">
                       <a16:colId xmlns:a16="http://schemas.microsoft.com/office/drawing/2014/main" val="3982327588"/>
@@ -9357,7 +9395,7 @@
                   </a:extLst>
                 </a:gridCol>
               </a:tblGrid>
-              <a:tr h="540279">
+              <a:tr h="454741">
                 <a:tc>
                   <a:txBody>
                     <a:bodyPr/>
@@ -9426,7 +9464,7 @@
                   </a:ext>
                 </a:extLst>
               </a:tr>
-              <a:tr h="386670">
+              <a:tr h="325451">
                 <a:tc>
                   <a:txBody>
                     <a:bodyPr/>
@@ -9478,7 +9516,7 @@
                   </a:ext>
                 </a:extLst>
               </a:tr>
-              <a:tr h="540279">
+              <a:tr h="615704">
                 <a:tc>
                   <a:txBody>
                     <a:bodyPr/>
@@ -9504,6 +9542,10 @@
                     <a:lstStyle/>
                     <a:p>
                       <a:pPr latinLnBrk="1"/>
+                      <a:r>
+                        <a:rPr lang="en-US" altLang="ko-KR" sz="1400" dirty="0"/>
+                        <a:t>65.138</a:t>
+                      </a:r>
                       <a:endParaRPr lang="ko-KR" altLang="en-US" sz="1400" dirty="0"/>
                     </a:p>
                   </a:txBody>
@@ -9515,6 +9557,10 @@
                     <a:lstStyle/>
                     <a:p>
                       <a:pPr latinLnBrk="1"/>
+                      <a:r>
+                        <a:rPr lang="en-US" altLang="ko-KR" sz="1400" dirty="0"/>
+                        <a:t>4.739</a:t>
+                      </a:r>
                       <a:endParaRPr lang="ko-KR" altLang="en-US" sz="1400" dirty="0"/>
                     </a:p>
                   </a:txBody>
@@ -9530,12 +9576,92 @@
           </a:graphicData>
         </a:graphic>
       </p:graphicFrame>
+      <p:sp>
+        <p:nvSpPr>
+          <p:cNvPr id="13" name="TextBox 12">
+            <a:extLst>
+              <a:ext uri="{FF2B5EF4-FFF2-40B4-BE49-F238E27FC236}">
+                <a16:creationId xmlns:a16="http://schemas.microsoft.com/office/drawing/2014/main" id="{97D351AC-9845-4FF6-A723-2DFEAB643A95}"/>
+              </a:ext>
+            </a:extLst>
+          </p:cNvPr>
+          <p:cNvSpPr txBox="1"/>
+          <p:nvPr/>
+        </p:nvSpPr>
+        <p:spPr>
+          <a:xfrm>
+            <a:off x="179512" y="1556792"/>
+            <a:ext cx="6408712" cy="461665"/>
+          </a:xfrm>
+          <a:prstGeom prst="rect">
+            <a:avLst/>
+          </a:prstGeom>
+          <a:noFill/>
+        </p:spPr>
+        <p:txBody>
+          <a:bodyPr wrap="square" rtlCol="0">
+            <a:spAutoFit/>
+          </a:bodyPr>
+          <a:lstStyle/>
+          <a:p>
+            <a:r>
+              <a:rPr lang="en-US" altLang="ko-KR" dirty="0" err="1"/>
+              <a:t>DenseNet</a:t>
+            </a:r>
+            <a:r>
+              <a:rPr lang="en-US" altLang="ko-KR" dirty="0"/>
+              <a:t> without Data Augmentation</a:t>
+            </a:r>
+            <a:endParaRPr lang="ko-KR" altLang="en-US" dirty="0"/>
+          </a:p>
+        </p:txBody>
+      </p:sp>
+      <p:sp>
+        <p:nvSpPr>
+          <p:cNvPr id="14" name="TextBox 13">
+            <a:extLst>
+              <a:ext uri="{FF2B5EF4-FFF2-40B4-BE49-F238E27FC236}">
+                <a16:creationId xmlns:a16="http://schemas.microsoft.com/office/drawing/2014/main" id="{982F87F7-FB09-449B-82A0-02D84AA323A6}"/>
+              </a:ext>
+            </a:extLst>
+          </p:cNvPr>
+          <p:cNvSpPr txBox="1"/>
+          <p:nvPr/>
+        </p:nvSpPr>
+        <p:spPr>
+          <a:xfrm>
+            <a:off x="179512" y="3903439"/>
+            <a:ext cx="6408712" cy="461665"/>
+          </a:xfrm>
+          <a:prstGeom prst="rect">
+            <a:avLst/>
+          </a:prstGeom>
+          <a:noFill/>
+        </p:spPr>
+        <p:txBody>
+          <a:bodyPr wrap="square" rtlCol="0">
+            <a:spAutoFit/>
+          </a:bodyPr>
+          <a:lstStyle/>
+          <a:p>
+            <a:r>
+              <a:rPr lang="en-US" altLang="ko-KR" dirty="0" err="1"/>
+              <a:t>DenseNet</a:t>
+            </a:r>
+            <a:r>
+              <a:rPr lang="en-US" altLang="ko-KR" dirty="0"/>
+              <a:t> with Data Augmentation</a:t>
+            </a:r>
+            <a:endParaRPr lang="ko-KR" altLang="en-US" dirty="0"/>
+          </a:p>
+        </p:txBody>
+      </p:sp>
       <p:pic>
         <p:nvPicPr>
-          <p:cNvPr id="10" name="Picture 9">
+          <p:cNvPr id="12" name="Picture 11">
             <a:extLst>
               <a:ext uri="{FF2B5EF4-FFF2-40B4-BE49-F238E27FC236}">
-                <a16:creationId xmlns:a16="http://schemas.microsoft.com/office/drawing/2014/main" id="{A40DB47E-261E-49BB-A35E-13BA293AF04F}"/>
+                <a16:creationId xmlns:a16="http://schemas.microsoft.com/office/drawing/2014/main" id="{54879ADA-6299-49B9-93D1-9FFC60B27316}"/>
               </a:ext>
             </a:extLst>
           </p:cNvPr>
@@ -9552,8 +9678,8 @@
         </p:blipFill>
         <p:spPr>
           <a:xfrm>
-            <a:off x="6588224" y="2120727"/>
-            <a:ext cx="2377862" cy="1652568"/>
+            <a:off x="107504" y="1214712"/>
+            <a:ext cx="4334927" cy="2709390"/>
           </a:xfrm>
           <a:prstGeom prst="rect">
             <a:avLst/>
@@ -9562,10 +9688,10 @@
       </p:pic>
       <p:pic>
         <p:nvPicPr>
-          <p:cNvPr id="12" name="Picture 11">
+          <p:cNvPr id="10" name="Picture 9">
             <a:extLst>
               <a:ext uri="{FF2B5EF4-FFF2-40B4-BE49-F238E27FC236}">
-                <a16:creationId xmlns:a16="http://schemas.microsoft.com/office/drawing/2014/main" id="{54879ADA-6299-49B9-93D1-9FFC60B27316}"/>
+                <a16:creationId xmlns:a16="http://schemas.microsoft.com/office/drawing/2014/main" id="{A40DB47E-261E-49BB-A35E-13BA293AF04F}"/>
               </a:ext>
             </a:extLst>
           </p:cNvPr>
@@ -9582,94 +9708,74 @@
         </p:blipFill>
         <p:spPr>
           <a:xfrm>
-            <a:off x="3870932" y="2114446"/>
-            <a:ext cx="2573276" cy="1674594"/>
+            <a:off x="4572000" y="1229150"/>
+            <a:ext cx="4389798" cy="2674289"/>
           </a:xfrm>
           <a:prstGeom prst="rect">
             <a:avLst/>
           </a:prstGeom>
         </p:spPr>
       </p:pic>
-      <p:sp>
-        <p:nvSpPr>
-          <p:cNvPr id="13" name="TextBox 12">
+      <p:pic>
+        <p:nvPicPr>
+          <p:cNvPr id="3" name="Picture 2">
             <a:extLst>
               <a:ext uri="{FF2B5EF4-FFF2-40B4-BE49-F238E27FC236}">
-                <a16:creationId xmlns:a16="http://schemas.microsoft.com/office/drawing/2014/main" id="{97D351AC-9845-4FF6-A723-2DFEAB643A95}"/>
+                <a16:creationId xmlns:a16="http://schemas.microsoft.com/office/drawing/2014/main" id="{E776407C-A133-442E-B73E-5587CF93BA75}"/>
               </a:ext>
             </a:extLst>
           </p:cNvPr>
-          <p:cNvSpPr txBox="1"/>
+          <p:cNvPicPr>
+            <a:picLocks noChangeAspect="1"/>
+          </p:cNvPicPr>
           <p:nvPr/>
-        </p:nvSpPr>
+        </p:nvPicPr>
+        <p:blipFill>
+          <a:blip r:embed="rId4"/>
+          <a:stretch>
+            <a:fillRect/>
+          </a:stretch>
+        </p:blipFill>
         <p:spPr>
           <a:xfrm>
-            <a:off x="179512" y="1556792"/>
-            <a:ext cx="6408712" cy="461665"/>
+            <a:off x="151925" y="3429000"/>
+            <a:ext cx="4312217" cy="2857242"/>
           </a:xfrm>
           <a:prstGeom prst="rect">
             <a:avLst/>
           </a:prstGeom>
-          <a:noFill/>
         </p:spPr>
-        <p:txBody>
-          <a:bodyPr wrap="square" rtlCol="0">
-            <a:spAutoFit/>
-          </a:bodyPr>
-          <a:lstStyle/>
-          <a:p>
-            <a:r>
-              <a:rPr lang="en-US" altLang="ko-KR" dirty="0" err="1"/>
-              <a:t>DenseNet</a:t>
-            </a:r>
-            <a:r>
-              <a:rPr lang="en-US" altLang="ko-KR" dirty="0"/>
-              <a:t> without Data Augmentation</a:t>
-            </a:r>
-            <a:endParaRPr lang="ko-KR" altLang="en-US" dirty="0"/>
-          </a:p>
-        </p:txBody>
-      </p:sp>
-      <p:sp>
-        <p:nvSpPr>
-          <p:cNvPr id="14" name="TextBox 13">
+      </p:pic>
+      <p:pic>
+        <p:nvPicPr>
+          <p:cNvPr id="7" name="Picture 6">
             <a:extLst>
               <a:ext uri="{FF2B5EF4-FFF2-40B4-BE49-F238E27FC236}">
-                <a16:creationId xmlns:a16="http://schemas.microsoft.com/office/drawing/2014/main" id="{982F87F7-FB09-449B-82A0-02D84AA323A6}"/>
+                <a16:creationId xmlns:a16="http://schemas.microsoft.com/office/drawing/2014/main" id="{FD31E24D-72F0-4CD1-A0EE-2D371DA42C4B}"/>
               </a:ext>
             </a:extLst>
           </p:cNvPr>
-          <p:cNvSpPr txBox="1"/>
+          <p:cNvPicPr>
+            <a:picLocks noChangeAspect="1"/>
+          </p:cNvPicPr>
           <p:nvPr/>
-        </p:nvSpPr>
+        </p:nvPicPr>
+        <p:blipFill>
+          <a:blip r:embed="rId5"/>
+          <a:stretch>
+            <a:fillRect/>
+          </a:stretch>
+        </p:blipFill>
         <p:spPr>
           <a:xfrm>
-            <a:off x="179512" y="3903439"/>
-            <a:ext cx="6408712" cy="461665"/>
+            <a:off x="4586115" y="3429000"/>
+            <a:ext cx="4375683" cy="2862469"/>
           </a:xfrm>
           <a:prstGeom prst="rect">
             <a:avLst/>
           </a:prstGeom>
-          <a:noFill/>
         </p:spPr>
-        <p:txBody>
-          <a:bodyPr wrap="square" rtlCol="0">
-            <a:spAutoFit/>
-          </a:bodyPr>
-          <a:lstStyle/>
-          <a:p>
-            <a:r>
-              <a:rPr lang="en-US" altLang="ko-KR" dirty="0" err="1"/>
-              <a:t>DenseNet</a:t>
-            </a:r>
-            <a:r>
-              <a:rPr lang="en-US" altLang="ko-KR" dirty="0"/>
-              <a:t> with Data Augmentation</a:t>
-            </a:r>
-            <a:endParaRPr lang="ko-KR" altLang="en-US" dirty="0"/>
-          </a:p>
-        </p:txBody>
-      </p:sp>
+      </p:pic>
     </p:spTree>
     <p:extLst>
       <p:ext uri="{BB962C8B-B14F-4D97-AF65-F5344CB8AC3E}">
@@ -9680,6 +9786,367 @@
   <p:clrMapOvr>
     <a:masterClrMapping/>
   </p:clrMapOvr>
+  <p:timing>
+    <p:tnLst>
+      <p:par>
+        <p:cTn id="1" dur="indefinite" restart="never" nodeType="tmRoot">
+          <p:childTnLst>
+            <p:seq concurrent="1" nextAc="seek">
+              <p:cTn id="2" dur="indefinite" nodeType="mainSeq">
+                <p:childTnLst>
+                  <p:par>
+                    <p:cTn id="3" fill="hold">
+                      <p:stCondLst>
+                        <p:cond delay="indefinite"/>
+                      </p:stCondLst>
+                      <p:childTnLst>
+                        <p:par>
+                          <p:cTn id="4" fill="hold">
+                            <p:stCondLst>
+                              <p:cond delay="0"/>
+                            </p:stCondLst>
+                            <p:childTnLst>
+                              <p:par>
+                                <p:cTn id="5" presetID="1" presetClass="entr" presetSubtype="0" fill="hold" nodeType="clickEffect">
+                                  <p:stCondLst>
+                                    <p:cond delay="0"/>
+                                  </p:stCondLst>
+                                  <p:childTnLst>
+                                    <p:set>
+                                      <p:cBhvr>
+                                        <p:cTn id="6" dur="1" fill="hold">
+                                          <p:stCondLst>
+                                            <p:cond delay="0"/>
+                                          </p:stCondLst>
+                                        </p:cTn>
+                                        <p:tgtEl>
+                                          <p:spTgt spid="12"/>
+                                        </p:tgtEl>
+                                        <p:attrNameLst>
+                                          <p:attrName>style.visibility</p:attrName>
+                                        </p:attrNameLst>
+                                      </p:cBhvr>
+                                      <p:to>
+                                        <p:strVal val="visible"/>
+                                      </p:to>
+                                    </p:set>
+                                  </p:childTnLst>
+                                </p:cTn>
+                              </p:par>
+                            </p:childTnLst>
+                          </p:cTn>
+                        </p:par>
+                      </p:childTnLst>
+                    </p:cTn>
+                  </p:par>
+                  <p:par>
+                    <p:cTn id="7" fill="hold">
+                      <p:stCondLst>
+                        <p:cond delay="indefinite"/>
+                      </p:stCondLst>
+                      <p:childTnLst>
+                        <p:par>
+                          <p:cTn id="8" fill="hold">
+                            <p:stCondLst>
+                              <p:cond delay="0"/>
+                            </p:stCondLst>
+                            <p:childTnLst>
+                              <p:par>
+                                <p:cTn id="9" presetID="1" presetClass="entr" presetSubtype="0" fill="hold" nodeType="clickEffect">
+                                  <p:stCondLst>
+                                    <p:cond delay="0"/>
+                                  </p:stCondLst>
+                                  <p:childTnLst>
+                                    <p:set>
+                                      <p:cBhvr>
+                                        <p:cTn id="10" dur="1" fill="hold">
+                                          <p:stCondLst>
+                                            <p:cond delay="0"/>
+                                          </p:stCondLst>
+                                        </p:cTn>
+                                        <p:tgtEl>
+                                          <p:spTgt spid="10"/>
+                                        </p:tgtEl>
+                                        <p:attrNameLst>
+                                          <p:attrName>style.visibility</p:attrName>
+                                        </p:attrNameLst>
+                                      </p:cBhvr>
+                                      <p:to>
+                                        <p:strVal val="visible"/>
+                                      </p:to>
+                                    </p:set>
+                                  </p:childTnLst>
+                                </p:cTn>
+                              </p:par>
+                            </p:childTnLst>
+                          </p:cTn>
+                        </p:par>
+                      </p:childTnLst>
+                    </p:cTn>
+                  </p:par>
+                  <p:par>
+                    <p:cTn id="11" fill="hold">
+                      <p:stCondLst>
+                        <p:cond delay="indefinite"/>
+                      </p:stCondLst>
+                      <p:childTnLst>
+                        <p:par>
+                          <p:cTn id="12" fill="hold">
+                            <p:stCondLst>
+                              <p:cond delay="0"/>
+                            </p:stCondLst>
+                            <p:childTnLst>
+                              <p:par>
+                                <p:cTn id="13" presetID="10" presetClass="exit" presetSubtype="0" fill="hold" nodeType="clickEffect">
+                                  <p:stCondLst>
+                                    <p:cond delay="0"/>
+                                  </p:stCondLst>
+                                  <p:childTnLst>
+                                    <p:animEffect transition="out" filter="fade">
+                                      <p:cBhvr>
+                                        <p:cTn id="14" dur="500"/>
+                                        <p:tgtEl>
+                                          <p:spTgt spid="12"/>
+                                        </p:tgtEl>
+                                      </p:cBhvr>
+                                    </p:animEffect>
+                                    <p:set>
+                                      <p:cBhvr>
+                                        <p:cTn id="15" dur="1" fill="hold">
+                                          <p:stCondLst>
+                                            <p:cond delay="499"/>
+                                          </p:stCondLst>
+                                        </p:cTn>
+                                        <p:tgtEl>
+                                          <p:spTgt spid="12"/>
+                                        </p:tgtEl>
+                                        <p:attrNameLst>
+                                          <p:attrName>style.visibility</p:attrName>
+                                        </p:attrNameLst>
+                                      </p:cBhvr>
+                                      <p:to>
+                                        <p:strVal val="hidden"/>
+                                      </p:to>
+                                    </p:set>
+                                  </p:childTnLst>
+                                </p:cTn>
+                              </p:par>
+                            </p:childTnLst>
+                          </p:cTn>
+                        </p:par>
+                      </p:childTnLst>
+                    </p:cTn>
+                  </p:par>
+                  <p:par>
+                    <p:cTn id="16" fill="hold">
+                      <p:stCondLst>
+                        <p:cond delay="indefinite"/>
+                      </p:stCondLst>
+                      <p:childTnLst>
+                        <p:par>
+                          <p:cTn id="17" fill="hold">
+                            <p:stCondLst>
+                              <p:cond delay="0"/>
+                            </p:stCondLst>
+                            <p:childTnLst>
+                              <p:par>
+                                <p:cTn id="18" presetID="10" presetClass="exit" presetSubtype="0" fill="hold" nodeType="clickEffect">
+                                  <p:stCondLst>
+                                    <p:cond delay="0"/>
+                                  </p:stCondLst>
+                                  <p:childTnLst>
+                                    <p:animEffect transition="out" filter="fade">
+                                      <p:cBhvr>
+                                        <p:cTn id="19" dur="500"/>
+                                        <p:tgtEl>
+                                          <p:spTgt spid="10"/>
+                                        </p:tgtEl>
+                                      </p:cBhvr>
+                                    </p:animEffect>
+                                    <p:set>
+                                      <p:cBhvr>
+                                        <p:cTn id="20" dur="1" fill="hold">
+                                          <p:stCondLst>
+                                            <p:cond delay="499"/>
+                                          </p:stCondLst>
+                                        </p:cTn>
+                                        <p:tgtEl>
+                                          <p:spTgt spid="10"/>
+                                        </p:tgtEl>
+                                        <p:attrNameLst>
+                                          <p:attrName>style.visibility</p:attrName>
+                                        </p:attrNameLst>
+                                      </p:cBhvr>
+                                      <p:to>
+                                        <p:strVal val="hidden"/>
+                                      </p:to>
+                                    </p:set>
+                                  </p:childTnLst>
+                                </p:cTn>
+                              </p:par>
+                            </p:childTnLst>
+                          </p:cTn>
+                        </p:par>
+                      </p:childTnLst>
+                    </p:cTn>
+                  </p:par>
+                  <p:par>
+                    <p:cTn id="21" fill="hold">
+                      <p:stCondLst>
+                        <p:cond delay="indefinite"/>
+                      </p:stCondLst>
+                      <p:childTnLst>
+                        <p:par>
+                          <p:cTn id="22" fill="hold">
+                            <p:stCondLst>
+                              <p:cond delay="0"/>
+                            </p:stCondLst>
+                            <p:childTnLst>
+                              <p:par>
+                                <p:cTn id="23" presetID="1" presetClass="entr" presetSubtype="0" fill="hold" nodeType="clickEffect">
+                                  <p:stCondLst>
+                                    <p:cond delay="0"/>
+                                  </p:stCondLst>
+                                  <p:childTnLst>
+                                    <p:set>
+                                      <p:cBhvr>
+                                        <p:cTn id="24" dur="1" fill="hold">
+                                          <p:stCondLst>
+                                            <p:cond delay="0"/>
+                                          </p:stCondLst>
+                                        </p:cTn>
+                                        <p:tgtEl>
+                                          <p:spTgt spid="9"/>
+                                        </p:tgtEl>
+                                        <p:attrNameLst>
+                                          <p:attrName>style.visibility</p:attrName>
+                                        </p:attrNameLst>
+                                      </p:cBhvr>
+                                      <p:to>
+                                        <p:strVal val="visible"/>
+                                      </p:to>
+                                    </p:set>
+                                  </p:childTnLst>
+                                </p:cTn>
+                              </p:par>
+                            </p:childTnLst>
+                          </p:cTn>
+                        </p:par>
+                      </p:childTnLst>
+                    </p:cTn>
+                  </p:par>
+                  <p:par>
+                    <p:cTn id="25" fill="hold">
+                      <p:stCondLst>
+                        <p:cond delay="indefinite"/>
+                      </p:stCondLst>
+                      <p:childTnLst>
+                        <p:par>
+                          <p:cTn id="26" fill="hold">
+                            <p:stCondLst>
+                              <p:cond delay="0"/>
+                            </p:stCondLst>
+                            <p:childTnLst>
+                              <p:par>
+                                <p:cTn id="27" presetID="1" presetClass="entr" presetSubtype="0" fill="hold" nodeType="clickEffect">
+                                  <p:stCondLst>
+                                    <p:cond delay="0"/>
+                                  </p:stCondLst>
+                                  <p:childTnLst>
+                                    <p:set>
+                                      <p:cBhvr>
+                                        <p:cTn id="28" dur="1" fill="hold">
+                                          <p:stCondLst>
+                                            <p:cond delay="0"/>
+                                          </p:stCondLst>
+                                        </p:cTn>
+                                        <p:tgtEl>
+                                          <p:spTgt spid="3"/>
+                                        </p:tgtEl>
+                                        <p:attrNameLst>
+                                          <p:attrName>style.visibility</p:attrName>
+                                        </p:attrNameLst>
+                                      </p:cBhvr>
+                                      <p:to>
+                                        <p:strVal val="visible"/>
+                                      </p:to>
+                                    </p:set>
+                                  </p:childTnLst>
+                                </p:cTn>
+                              </p:par>
+                            </p:childTnLst>
+                          </p:cTn>
+                        </p:par>
+                      </p:childTnLst>
+                    </p:cTn>
+                  </p:par>
+                  <p:par>
+                    <p:cTn id="29" fill="hold">
+                      <p:stCondLst>
+                        <p:cond delay="indefinite"/>
+                      </p:stCondLst>
+                      <p:childTnLst>
+                        <p:par>
+                          <p:cTn id="30" fill="hold">
+                            <p:stCondLst>
+                              <p:cond delay="0"/>
+                            </p:stCondLst>
+                            <p:childTnLst>
+                              <p:par>
+                                <p:cTn id="31" presetID="1" presetClass="entr" presetSubtype="0" fill="hold" nodeType="clickEffect">
+                                  <p:stCondLst>
+                                    <p:cond delay="0"/>
+                                  </p:stCondLst>
+                                  <p:childTnLst>
+                                    <p:set>
+                                      <p:cBhvr>
+                                        <p:cTn id="32" dur="1" fill="hold">
+                                          <p:stCondLst>
+                                            <p:cond delay="0"/>
+                                          </p:stCondLst>
+                                        </p:cTn>
+                                        <p:tgtEl>
+                                          <p:spTgt spid="7"/>
+                                        </p:tgtEl>
+                                        <p:attrNameLst>
+                                          <p:attrName>style.visibility</p:attrName>
+                                        </p:attrNameLst>
+                                      </p:cBhvr>
+                                      <p:to>
+                                        <p:strVal val="visible"/>
+                                      </p:to>
+                                    </p:set>
+                                  </p:childTnLst>
+                                </p:cTn>
+                              </p:par>
+                            </p:childTnLst>
+                          </p:cTn>
+                        </p:par>
+                      </p:childTnLst>
+                    </p:cTn>
+                  </p:par>
+                </p:childTnLst>
+              </p:cTn>
+              <p:prevCondLst>
+                <p:cond evt="onPrev" delay="0">
+                  <p:tgtEl>
+                    <p:sldTgt/>
+                  </p:tgtEl>
+                </p:cond>
+              </p:prevCondLst>
+              <p:nextCondLst>
+                <p:cond evt="onNext" delay="0">
+                  <p:tgtEl>
+                    <p:sldTgt/>
+                  </p:tgtEl>
+                </p:cond>
+              </p:nextCondLst>
+            </p:seq>
+          </p:childTnLst>
+        </p:cTn>
+      </p:par>
+    </p:tnLst>
+  </p:timing>
 </p:sld>
 </file>
 

</xml_diff>

<commit_message>
changed the tables on slide 10
</commit_message>
<xml_diff>
--- a/ATML_presentation.pptx
+++ b/ATML_presentation.pptx
@@ -5892,14 +5892,14 @@
           <p:nvPr>
             <p:extLst>
               <p:ext uri="{D42A27DB-BD31-4B8C-83A1-F6EECF244321}">
-                <p14:modId xmlns:p14="http://schemas.microsoft.com/office/powerpoint/2010/main" val="904311017"/>
+                <p14:modId xmlns:p14="http://schemas.microsoft.com/office/powerpoint/2010/main" val="3271838081"/>
               </p:ext>
             </p:extLst>
           </p:nvPr>
         </p:nvGraphicFramePr>
         <p:xfrm>
-          <a:off x="2699792" y="2218863"/>
-          <a:ext cx="4071142" cy="1498169"/>
+          <a:off x="395536" y="2132856"/>
+          <a:ext cx="4121040" cy="1440160"/>
         </p:xfrm>
         <a:graphic>
           <a:graphicData uri="http://schemas.openxmlformats.org/drawingml/2006/table">
@@ -5908,21 +5908,21 @@
                 <a:tableStyleId>{073A0DAA-6AF3-43AB-8588-CEC1D06C72B9}</a:tableStyleId>
               </a:tblPr>
               <a:tblGrid>
-                <a:gridCol w="1565822">
+                <a:gridCol w="1585014">
                   <a:extLst>
                     <a:ext uri="{9D8B030D-6E8A-4147-A177-3AD203B41FA5}">
                       <a16:colId xmlns:a16="http://schemas.microsoft.com/office/drawing/2014/main" val="4077253036"/>
                     </a:ext>
                   </a:extLst>
                 </a:gridCol>
-                <a:gridCol w="1252659">
+                <a:gridCol w="1268012">
                   <a:extLst>
                     <a:ext uri="{9D8B030D-6E8A-4147-A177-3AD203B41FA5}">
                       <a16:colId xmlns:a16="http://schemas.microsoft.com/office/drawing/2014/main" val="1373654776"/>
                     </a:ext>
                   </a:extLst>
                 </a:gridCol>
-                <a:gridCol w="1252661">
+                <a:gridCol w="1268014">
                   <a:extLst>
                     <a:ext uri="{9D8B030D-6E8A-4147-A177-3AD203B41FA5}">
                       <a16:colId xmlns:a16="http://schemas.microsoft.com/office/drawing/2014/main" val="3982327588"/>
@@ -5930,21 +5930,21 @@
                   </a:extLst>
                 </a:gridCol>
               </a:tblGrid>
-              <a:tr h="512463">
+              <a:tr h="773246">
                 <a:tc>
                   <a:txBody>
                     <a:bodyPr/>
                     <a:lstStyle/>
                     <a:p>
-                      <a:pPr latinLnBrk="1"/>
+                      <a:pPr algn="ctr" latinLnBrk="1">
+                        <a:lnSpc>
+                          <a:spcPct val="200000"/>
+                        </a:lnSpc>
+                      </a:pPr>
                       <a:r>
-                        <a:rPr lang="en-US" altLang="ko-KR" sz="1400" dirty="0"/>
-                        <a:t>Setting</a:t>
+                        <a:rPr lang="en-US" altLang="ko-KR" sz="1600" dirty="0"/>
+                        <a:t>Training</a:t>
                       </a:r>
-                    </a:p>
-                    <a:p>
-                      <a:pPr latinLnBrk="1"/>
-                      <a:endParaRPr lang="ko-KR" altLang="en-US" sz="1400" dirty="0"/>
                     </a:p>
                   </a:txBody>
                   <a:tcPr/>
@@ -5954,12 +5954,12 @@
                     <a:bodyPr/>
                     <a:lstStyle/>
                     <a:p>
-                      <a:pPr latinLnBrk="1"/>
+                      <a:pPr algn="ctr" latinLnBrk="1"/>
                       <a:r>
-                        <a:rPr lang="en-US" altLang="ko-KR" sz="1400" dirty="0"/>
+                        <a:rPr lang="en-US" altLang="ko-KR" sz="1600" dirty="0"/>
                         <a:t>Train accuracy</a:t>
                       </a:r>
-                      <a:endParaRPr lang="ko-KR" altLang="en-US" sz="1400" dirty="0"/>
+                      <a:endParaRPr lang="ko-KR" altLang="en-US" sz="1600" dirty="0"/>
                     </a:p>
                   </a:txBody>
                   <a:tcPr/>
@@ -5969,12 +5969,12 @@
                     <a:bodyPr/>
                     <a:lstStyle/>
                     <a:p>
-                      <a:pPr latinLnBrk="1"/>
+                      <a:pPr algn="ctr" latinLnBrk="1"/>
                       <a:r>
-                        <a:rPr lang="en-US" altLang="ko-KR" sz="1400" dirty="0"/>
+                        <a:rPr lang="en-US" altLang="ko-KR" sz="1600" dirty="0"/>
                         <a:t>Validation accuracy</a:t>
                       </a:r>
-                      <a:endParaRPr lang="ko-KR" altLang="en-US" sz="1400" dirty="0"/>
+                      <a:endParaRPr lang="ko-KR" altLang="en-US" sz="1600" dirty="0"/>
                     </a:p>
                   </a:txBody>
                   <a:tcPr/>
@@ -5985,18 +5985,22 @@
                   </a:ext>
                 </a:extLst>
               </a:tr>
-              <a:tr h="461849">
+              <a:tr h="666914">
                 <a:tc>
                   <a:txBody>
                     <a:bodyPr/>
                     <a:lstStyle/>
                     <a:p>
-                      <a:pPr latinLnBrk="1"/>
+                      <a:pPr algn="ctr" latinLnBrk="1">
+                        <a:lnSpc>
+                          <a:spcPct val="200000"/>
+                        </a:lnSpc>
+                      </a:pPr>
                       <a:r>
-                        <a:rPr lang="en-US" altLang="ko-KR" sz="1400" dirty="0" err="1"/>
-                        <a:t>DenseNet</a:t>
+                        <a:rPr lang="en-US" altLang="ko-KR" sz="1600" dirty="0"/>
+                        <a:t>accuracy</a:t>
                       </a:r>
-                      <a:endParaRPr lang="ko-KR" altLang="en-US" sz="1400" dirty="0"/>
+                      <a:endParaRPr lang="ko-KR" altLang="en-US" sz="1600" dirty="0"/>
                     </a:p>
                   </a:txBody>
                   <a:tcPr/>
@@ -6006,12 +6010,16 @@
                     <a:bodyPr/>
                     <a:lstStyle/>
                     <a:p>
-                      <a:pPr latinLnBrk="1"/>
+                      <a:pPr algn="ctr" latinLnBrk="1">
+                        <a:lnSpc>
+                          <a:spcPct val="200000"/>
+                        </a:lnSpc>
+                      </a:pPr>
                       <a:r>
-                        <a:rPr lang="en-US" altLang="ko-KR" sz="1400" dirty="0"/>
+                        <a:rPr lang="en-US" altLang="ko-KR" sz="1600" dirty="0"/>
                         <a:t>99.9685</a:t>
                       </a:r>
-                      <a:endParaRPr lang="ko-KR" altLang="en-US" sz="1400" dirty="0"/>
+                      <a:endParaRPr lang="ko-KR" altLang="en-US" sz="1600" dirty="0"/>
                     </a:p>
                   </a:txBody>
                   <a:tcPr/>
@@ -6021,12 +6029,16 @@
                     <a:bodyPr/>
                     <a:lstStyle/>
                     <a:p>
-                      <a:pPr latinLnBrk="1"/>
+                      <a:pPr algn="ctr" latinLnBrk="1">
+                        <a:lnSpc>
+                          <a:spcPct val="200000"/>
+                        </a:lnSpc>
+                      </a:pPr>
                       <a:r>
-                        <a:rPr lang="en-US" altLang="ko-KR" sz="1400" dirty="0"/>
+                        <a:rPr lang="en-US" altLang="ko-KR" sz="1600" dirty="0"/>
                         <a:t>99.924</a:t>
                       </a:r>
-                      <a:endParaRPr lang="ko-KR" altLang="en-US" sz="1400" dirty="0"/>
+                      <a:endParaRPr lang="ko-KR" altLang="en-US" sz="1600" dirty="0"/>
                     </a:p>
                   </a:txBody>
                   <a:tcPr/>
@@ -6037,22 +6049,159 @@
                   </a:ext>
                 </a:extLst>
               </a:tr>
-              <a:tr h="512463">
+            </a:tbl>
+          </a:graphicData>
+        </a:graphic>
+      </p:graphicFrame>
+      <p:sp>
+        <p:nvSpPr>
+          <p:cNvPr id="13" name="TextBox 12">
+            <a:extLst>
+              <a:ext uri="{FF2B5EF4-FFF2-40B4-BE49-F238E27FC236}">
+                <a16:creationId xmlns:a16="http://schemas.microsoft.com/office/drawing/2014/main" id="{97D351AC-9845-4FF6-A723-2DFEAB643A95}"/>
+              </a:ext>
+            </a:extLst>
+          </p:cNvPr>
+          <p:cNvSpPr txBox="1"/>
+          <p:nvPr/>
+        </p:nvSpPr>
+        <p:spPr>
+          <a:xfrm>
+            <a:off x="179512" y="1556792"/>
+            <a:ext cx="6408712" cy="461665"/>
+          </a:xfrm>
+          <a:prstGeom prst="rect">
+            <a:avLst/>
+          </a:prstGeom>
+          <a:noFill/>
+        </p:spPr>
+        <p:txBody>
+          <a:bodyPr wrap="square" rtlCol="0">
+            <a:spAutoFit/>
+          </a:bodyPr>
+          <a:lstStyle/>
+          <a:p>
+            <a:r>
+              <a:rPr lang="en-US" altLang="ko-KR" dirty="0" err="1"/>
+              <a:t>DenseNet</a:t>
+            </a:r>
+            <a:r>
+              <a:rPr lang="en-US" altLang="ko-KR" dirty="0"/>
+              <a:t> without data augmentation</a:t>
+            </a:r>
+            <a:endParaRPr lang="ko-KR" altLang="en-US" dirty="0"/>
+          </a:p>
+        </p:txBody>
+      </p:sp>
+      <p:sp>
+        <p:nvSpPr>
+          <p:cNvPr id="14" name="TextBox 13">
+            <a:extLst>
+              <a:ext uri="{FF2B5EF4-FFF2-40B4-BE49-F238E27FC236}">
+                <a16:creationId xmlns:a16="http://schemas.microsoft.com/office/drawing/2014/main" id="{982F87F7-FB09-449B-82A0-02D84AA323A6}"/>
+              </a:ext>
+            </a:extLst>
+          </p:cNvPr>
+          <p:cNvSpPr txBox="1"/>
+          <p:nvPr/>
+        </p:nvSpPr>
+        <p:spPr>
+          <a:xfrm>
+            <a:off x="179512" y="3933056"/>
+            <a:ext cx="6408712" cy="461665"/>
+          </a:xfrm>
+          <a:prstGeom prst="rect">
+            <a:avLst/>
+          </a:prstGeom>
+          <a:noFill/>
+        </p:spPr>
+        <p:txBody>
+          <a:bodyPr wrap="square" rtlCol="0">
+            <a:spAutoFit/>
+          </a:bodyPr>
+          <a:lstStyle/>
+          <a:p>
+            <a:r>
+              <a:rPr lang="en-US" altLang="ko-KR" dirty="0" err="1"/>
+              <a:t>DenseNet</a:t>
+            </a:r>
+            <a:r>
+              <a:rPr lang="en-US" altLang="ko-KR" dirty="0"/>
+              <a:t> with data augmentation</a:t>
+            </a:r>
+            <a:endParaRPr lang="ko-KR" altLang="en-US" dirty="0"/>
+          </a:p>
+        </p:txBody>
+      </p:sp>
+      <p:graphicFrame>
+        <p:nvGraphicFramePr>
+          <p:cNvPr id="17" name="Table 16">
+            <a:extLst>
+              <a:ext uri="{FF2B5EF4-FFF2-40B4-BE49-F238E27FC236}">
+                <a16:creationId xmlns:a16="http://schemas.microsoft.com/office/drawing/2014/main" id="{2F2BC5E1-AF93-412F-B625-F26F5F021FCC}"/>
+              </a:ext>
+            </a:extLst>
+          </p:cNvPr>
+          <p:cNvGraphicFramePr>
+            <a:graphicFrameLocks noGrp="1"/>
+          </p:cNvGraphicFramePr>
+          <p:nvPr>
+            <p:extLst>
+              <p:ext uri="{D42A27DB-BD31-4B8C-83A1-F6EECF244321}">
+                <p14:modId xmlns:p14="http://schemas.microsoft.com/office/powerpoint/2010/main" val="2813545136"/>
+              </p:ext>
+            </p:extLst>
+          </p:nvPr>
+        </p:nvGraphicFramePr>
+        <p:xfrm>
+          <a:off x="4670869" y="2126473"/>
+          <a:ext cx="4200129" cy="1446543"/>
+        </p:xfrm>
+        <a:graphic>
+          <a:graphicData uri="http://schemas.openxmlformats.org/drawingml/2006/table">
+            <a:tbl>
+              <a:tblPr firstRow="1" bandRow="1">
+                <a:tableStyleId>{073A0DAA-6AF3-43AB-8588-CEC1D06C72B9}</a:tableStyleId>
+              </a:tblPr>
+              <a:tblGrid>
+                <a:gridCol w="1400043">
+                  <a:extLst>
+                    <a:ext uri="{9D8B030D-6E8A-4147-A177-3AD203B41FA5}">
+                      <a16:colId xmlns:a16="http://schemas.microsoft.com/office/drawing/2014/main" val="2148399822"/>
+                    </a:ext>
+                  </a:extLst>
+                </a:gridCol>
+                <a:gridCol w="1400043">
+                  <a:extLst>
+                    <a:ext uri="{9D8B030D-6E8A-4147-A177-3AD203B41FA5}">
+                      <a16:colId xmlns:a16="http://schemas.microsoft.com/office/drawing/2014/main" val="396802700"/>
+                    </a:ext>
+                  </a:extLst>
+                </a:gridCol>
+                <a:gridCol w="1400043">
+                  <a:extLst>
+                    <a:ext uri="{9D8B030D-6E8A-4147-A177-3AD203B41FA5}">
+                      <a16:colId xmlns:a16="http://schemas.microsoft.com/office/drawing/2014/main" val="3915125624"/>
+                    </a:ext>
+                  </a:extLst>
+                </a:gridCol>
+              </a:tblGrid>
+              <a:tr h="763728">
                 <a:tc>
                   <a:txBody>
                     <a:bodyPr/>
                     <a:lstStyle/>
                     <a:p>
-                      <a:pPr latinLnBrk="1"/>
+                      <a:pPr algn="ctr" latinLnBrk="1">
+                        <a:lnSpc>
+                          <a:spcPct val="200000"/>
+                        </a:lnSpc>
+                      </a:pPr>
                       <a:r>
-                        <a:rPr lang="en-US" altLang="ko-KR" sz="1400" dirty="0" err="1"/>
-                        <a:t>DenseNet</a:t>
+                        <a:rPr lang="en-US" altLang="ko-KR" sz="1600" dirty="0"/>
+                        <a:t>Test</a:t>
                       </a:r>
-                      <a:r>
-                        <a:rPr lang="en-US" altLang="ko-KR" sz="1400" dirty="0"/>
-                        <a:t> with Augmentation</a:t>
-                      </a:r>
-                      <a:endParaRPr lang="ko-KR" altLang="en-US" sz="1400" dirty="0"/>
+                      <a:endParaRPr lang="ko-KR" altLang="en-US" sz="1600" dirty="0"/>
                     </a:p>
                   </a:txBody>
                   <a:tcPr/>
@@ -6062,12 +6211,27 @@
                     <a:bodyPr/>
                     <a:lstStyle/>
                     <a:p>
-                      <a:pPr latinLnBrk="1"/>
+                      <a:pPr algn="ctr" latinLnBrk="1">
+                        <a:lnSpc>
+                          <a:spcPct val="100000"/>
+                        </a:lnSpc>
+                      </a:pPr>
                       <a:r>
-                        <a:rPr lang="en-US" altLang="ko-KR" sz="1400" dirty="0"/>
-                        <a:t>50.3439</a:t>
+                        <a:rPr lang="en-US" altLang="ko-KR" sz="1600" dirty="0"/>
+                        <a:t>“Spelling”</a:t>
                       </a:r>
-                      <a:endParaRPr lang="ko-KR" altLang="en-US" sz="1400" dirty="0"/>
+                    </a:p>
+                    <a:p>
+                      <a:pPr algn="ctr" latinLnBrk="1">
+                        <a:lnSpc>
+                          <a:spcPct val="100000"/>
+                        </a:lnSpc>
+                      </a:pPr>
+                      <a:r>
+                        <a:rPr lang="en-US" altLang="ko-KR" sz="1600" dirty="0"/>
+                        <a:t>Test set</a:t>
+                      </a:r>
+                      <a:endParaRPr lang="ko-KR" altLang="en-US" sz="1600" dirty="0"/>
                     </a:p>
                   </a:txBody>
                   <a:tcPr/>
@@ -6077,19 +6241,98 @@
                     <a:bodyPr/>
                     <a:lstStyle/>
                     <a:p>
-                      <a:pPr latinLnBrk="1"/>
+                      <a:pPr algn="ctr" latinLnBrk="1">
+                        <a:lnSpc>
+                          <a:spcPct val="100000"/>
+                        </a:lnSpc>
+                      </a:pPr>
                       <a:r>
-                        <a:rPr lang="en-US" altLang="ko-KR" sz="1400" dirty="0"/>
-                        <a:t>94.2264</a:t>
+                        <a:rPr lang="en-US" altLang="ko-KR" sz="1600" dirty="0"/>
+                        <a:t>“Kaggle”</a:t>
                       </a:r>
-                      <a:endParaRPr lang="ko-KR" altLang="en-US" sz="1400" dirty="0"/>
+                    </a:p>
+                    <a:p>
+                      <a:pPr algn="ctr" latinLnBrk="1">
+                        <a:lnSpc>
+                          <a:spcPct val="100000"/>
+                        </a:lnSpc>
+                      </a:pPr>
+                      <a:r>
+                        <a:rPr lang="en-US" altLang="ko-KR" sz="1600" dirty="0"/>
+                        <a:t>Test set</a:t>
+                      </a:r>
+                      <a:endParaRPr lang="ko-KR" altLang="en-US" sz="1600" dirty="0"/>
                     </a:p>
                   </a:txBody>
                   <a:tcPr/>
                 </a:tc>
                 <a:extLst>
                   <a:ext uri="{0D108BD9-81ED-4DB2-BD59-A6C34878D82A}">
-                    <a16:rowId xmlns:a16="http://schemas.microsoft.com/office/drawing/2014/main" val="4040917903"/>
+                    <a16:rowId xmlns:a16="http://schemas.microsoft.com/office/drawing/2014/main" val="904314136"/>
+                  </a:ext>
+                </a:extLst>
+              </a:tr>
+              <a:tr h="682815">
+                <a:tc>
+                  <a:txBody>
+                    <a:bodyPr/>
+                    <a:lstStyle/>
+                    <a:p>
+                      <a:pPr algn="ctr" latinLnBrk="1">
+                        <a:lnSpc>
+                          <a:spcPct val="200000"/>
+                        </a:lnSpc>
+                      </a:pPr>
+                      <a:r>
+                        <a:rPr lang="en-US" altLang="ko-KR" sz="1600" dirty="0"/>
+                        <a:t>accuracy</a:t>
+                      </a:r>
+                      <a:endParaRPr lang="ko-KR" altLang="en-US" sz="1600" dirty="0"/>
+                    </a:p>
+                  </a:txBody>
+                  <a:tcPr/>
+                </a:tc>
+                <a:tc>
+                  <a:txBody>
+                    <a:bodyPr/>
+                    <a:lstStyle/>
+                    <a:p>
+                      <a:pPr algn="ctr" latinLnBrk="1">
+                        <a:lnSpc>
+                          <a:spcPct val="200000"/>
+                        </a:lnSpc>
+                      </a:pPr>
+                      <a:r>
+                        <a:rPr lang="en-US" altLang="ko-KR" sz="1600" dirty="0"/>
+                        <a:t>83.852</a:t>
+                      </a:r>
+                      <a:endParaRPr lang="ko-KR" altLang="en-US" sz="1600" dirty="0"/>
+                    </a:p>
+                  </a:txBody>
+                  <a:tcPr/>
+                </a:tc>
+                <a:tc>
+                  <a:txBody>
+                    <a:bodyPr/>
+                    <a:lstStyle/>
+                    <a:p>
+                      <a:pPr algn="ctr" latinLnBrk="1">
+                        <a:lnSpc>
+                          <a:spcPct val="200000"/>
+                        </a:lnSpc>
+                      </a:pPr>
+                      <a:r>
+                        <a:rPr lang="en-US" altLang="ko-KR" sz="1600" dirty="0"/>
+                        <a:t>2.625</a:t>
+                      </a:r>
+                      <a:endParaRPr lang="ko-KR" altLang="en-US" sz="1600" dirty="0"/>
+                    </a:p>
+                  </a:txBody>
+                  <a:tcPr/>
+                </a:tc>
+                <a:extLst>
+                  <a:ext uri="{0D108BD9-81ED-4DB2-BD59-A6C34878D82A}">
+                    <a16:rowId xmlns:a16="http://schemas.microsoft.com/office/drawing/2014/main" val="845365693"/>
                   </a:ext>
                 </a:extLst>
               </a:tr>
@@ -6099,10 +6342,10 @@
       </p:graphicFrame>
       <p:graphicFrame>
         <p:nvGraphicFramePr>
-          <p:cNvPr id="9" name="Table 8">
+          <p:cNvPr id="18" name="Table 17">
             <a:extLst>
               <a:ext uri="{FF2B5EF4-FFF2-40B4-BE49-F238E27FC236}">
-                <a16:creationId xmlns:a16="http://schemas.microsoft.com/office/drawing/2014/main" id="{59542E6C-E195-472D-85E1-1F18CEF478D7}"/>
+                <a16:creationId xmlns:a16="http://schemas.microsoft.com/office/drawing/2014/main" id="{E1E7E238-52BE-42C7-8469-539CAE06CEA7}"/>
               </a:ext>
             </a:extLst>
           </p:cNvPr>
@@ -6112,14 +6355,14 @@
           <p:nvPr>
             <p:extLst>
               <p:ext uri="{D42A27DB-BD31-4B8C-83A1-F6EECF244321}">
-                <p14:modId xmlns:p14="http://schemas.microsoft.com/office/powerpoint/2010/main" val="2450563911"/>
+                <p14:modId xmlns:p14="http://schemas.microsoft.com/office/powerpoint/2010/main" val="13026685"/>
               </p:ext>
             </p:extLst>
           </p:nvPr>
         </p:nvGraphicFramePr>
         <p:xfrm>
-          <a:off x="2699792" y="4553382"/>
-          <a:ext cx="4071142" cy="1459315"/>
+          <a:off x="378952" y="4653136"/>
+          <a:ext cx="4121040" cy="1523219"/>
         </p:xfrm>
         <a:graphic>
           <a:graphicData uri="http://schemas.openxmlformats.org/drawingml/2006/table">
@@ -6128,21 +6371,21 @@
                 <a:tableStyleId>{073A0DAA-6AF3-43AB-8588-CEC1D06C72B9}</a:tableStyleId>
               </a:tblPr>
               <a:tblGrid>
-                <a:gridCol w="1565823">
+                <a:gridCol w="1585014">
                   <a:extLst>
                     <a:ext uri="{9D8B030D-6E8A-4147-A177-3AD203B41FA5}">
                       <a16:colId xmlns:a16="http://schemas.microsoft.com/office/drawing/2014/main" val="4077253036"/>
                     </a:ext>
                   </a:extLst>
                 </a:gridCol>
-                <a:gridCol w="1148270">
+                <a:gridCol w="1268012">
                   <a:extLst>
                     <a:ext uri="{9D8B030D-6E8A-4147-A177-3AD203B41FA5}">
                       <a16:colId xmlns:a16="http://schemas.microsoft.com/office/drawing/2014/main" val="1373654776"/>
                     </a:ext>
                   </a:extLst>
                 </a:gridCol>
-                <a:gridCol w="1357049">
+                <a:gridCol w="1268014">
                   <a:extLst>
                     <a:ext uri="{9D8B030D-6E8A-4147-A177-3AD203B41FA5}">
                       <a16:colId xmlns:a16="http://schemas.microsoft.com/office/drawing/2014/main" val="3982327588"/>
@@ -6150,21 +6393,25 @@
                   </a:extLst>
                 </a:gridCol>
               </a:tblGrid>
-              <a:tr h="454741">
+              <a:tr h="811909">
                 <a:tc>
                   <a:txBody>
                     <a:bodyPr/>
                     <a:lstStyle/>
                     <a:p>
-                      <a:pPr latinLnBrk="1"/>
+                      <a:pPr algn="ctr" latinLnBrk="1">
+                        <a:lnSpc>
+                          <a:spcPct val="200000"/>
+                        </a:lnSpc>
+                      </a:pPr>
                       <a:r>
-                        <a:rPr lang="en-US" altLang="ko-KR" sz="1400" dirty="0"/>
-                        <a:t>Setting</a:t>
+                        <a:rPr lang="en-US" altLang="ko-KR" sz="1600" dirty="0"/>
+                        <a:t>Training</a:t>
                       </a:r>
                     </a:p>
                     <a:p>
-                      <a:pPr latinLnBrk="1"/>
-                      <a:endParaRPr lang="ko-KR" altLang="en-US" sz="1400" dirty="0"/>
+                      <a:pPr algn="ctr" latinLnBrk="1"/>
+                      <a:endParaRPr lang="ko-KR" altLang="en-US" sz="1600" dirty="0"/>
                     </a:p>
                   </a:txBody>
                   <a:tcPr/>
@@ -6174,19 +6421,12 @@
                     <a:bodyPr/>
                     <a:lstStyle/>
                     <a:p>
-                      <a:pPr latinLnBrk="1"/>
+                      <a:pPr algn="ctr" latinLnBrk="1"/>
                       <a:r>
-                        <a:rPr lang="en-US" altLang="ko-KR" sz="1400" dirty="0"/>
-                        <a:t>“spelling”</a:t>
+                        <a:rPr lang="en-US" altLang="ko-KR" sz="1600" dirty="0"/>
+                        <a:t>Train accuracy</a:t>
                       </a:r>
-                    </a:p>
-                    <a:p>
-                      <a:pPr latinLnBrk="1"/>
-                      <a:r>
-                        <a:rPr lang="en-US" altLang="ko-KR" sz="1400" dirty="0"/>
-                        <a:t>Test set</a:t>
-                      </a:r>
-                      <a:endParaRPr lang="ko-KR" altLang="en-US" sz="1400" dirty="0"/>
+                      <a:endParaRPr lang="ko-KR" altLang="en-US" sz="1600" dirty="0"/>
                     </a:p>
                   </a:txBody>
                   <a:tcPr/>
@@ -6196,19 +6436,12 @@
                     <a:bodyPr/>
                     <a:lstStyle/>
                     <a:p>
-                      <a:pPr latinLnBrk="1"/>
+                      <a:pPr algn="ctr" latinLnBrk="1"/>
                       <a:r>
-                        <a:rPr lang="en-US" altLang="ko-KR" sz="1400" dirty="0"/>
-                        <a:t>“Kaggle”</a:t>
+                        <a:rPr lang="en-US" altLang="ko-KR" sz="1600" dirty="0"/>
+                        <a:t>Validation accuracy</a:t>
                       </a:r>
-                    </a:p>
-                    <a:p>
-                      <a:pPr latinLnBrk="1"/>
-                      <a:r>
-                        <a:rPr lang="en-US" altLang="ko-KR" sz="1400" dirty="0"/>
-                        <a:t>Test set</a:t>
-                      </a:r>
-                      <a:endParaRPr lang="ko-KR" altLang="en-US" sz="1400" dirty="0"/>
+                      <a:endParaRPr lang="ko-KR" altLang="en-US" sz="1600" dirty="0"/>
                     </a:p>
                   </a:txBody>
                   <a:tcPr/>
@@ -6219,18 +6452,22 @@
                   </a:ext>
                 </a:extLst>
               </a:tr>
-              <a:tr h="325451">
+              <a:tr h="700259">
                 <a:tc>
                   <a:txBody>
                     <a:bodyPr/>
                     <a:lstStyle/>
                     <a:p>
-                      <a:pPr latinLnBrk="1"/>
+                      <a:pPr algn="ctr" latinLnBrk="1">
+                        <a:lnSpc>
+                          <a:spcPct val="200000"/>
+                        </a:lnSpc>
+                      </a:pPr>
                       <a:r>
-                        <a:rPr lang="en-US" altLang="ko-KR" sz="1400" dirty="0" err="1"/>
-                        <a:t>DenseNet</a:t>
+                        <a:rPr lang="en-US" altLang="ko-KR" sz="1600" dirty="0"/>
+                        <a:t>accuracy</a:t>
                       </a:r>
-                      <a:endParaRPr lang="ko-KR" altLang="en-US" sz="1400" dirty="0"/>
+                      <a:endParaRPr lang="ko-KR" altLang="en-US" sz="1600" dirty="0"/>
                     </a:p>
                   </a:txBody>
                   <a:tcPr/>
@@ -6240,12 +6477,16 @@
                     <a:bodyPr/>
                     <a:lstStyle/>
                     <a:p>
-                      <a:pPr latinLnBrk="1"/>
+                      <a:pPr algn="ctr" latinLnBrk="1">
+                        <a:lnSpc>
+                          <a:spcPct val="200000"/>
+                        </a:lnSpc>
+                      </a:pPr>
                       <a:r>
-                        <a:rPr lang="en-US" altLang="ko-KR" sz="1400" dirty="0"/>
-                        <a:t>83.852</a:t>
+                        <a:rPr lang="en-US" altLang="ko-KR" sz="1600" dirty="0"/>
+                        <a:t>50.3439</a:t>
                       </a:r>
-                      <a:endParaRPr lang="ko-KR" altLang="en-US" sz="1400" dirty="0"/>
+                      <a:endParaRPr lang="ko-KR" altLang="en-US" sz="1600" dirty="0"/>
                     </a:p>
                   </a:txBody>
                   <a:tcPr/>
@@ -6255,12 +6496,16 @@
                     <a:bodyPr/>
                     <a:lstStyle/>
                     <a:p>
-                      <a:pPr latinLnBrk="1"/>
+                      <a:pPr algn="ctr" latinLnBrk="1">
+                        <a:lnSpc>
+                          <a:spcPct val="200000"/>
+                        </a:lnSpc>
+                      </a:pPr>
                       <a:r>
-                        <a:rPr lang="en-US" altLang="ko-KR" sz="1400" dirty="0"/>
-                        <a:t>2.625</a:t>
+                        <a:rPr lang="en-US" altLang="ko-KR" sz="1600" dirty="0"/>
+                        <a:t>94.2264</a:t>
                       </a:r>
-                      <a:endParaRPr lang="ko-KR" altLang="en-US" sz="1400" dirty="0"/>
+                      <a:endParaRPr lang="ko-KR" altLang="en-US" sz="1600" dirty="0"/>
                     </a:p>
                   </a:txBody>
                   <a:tcPr/>
@@ -6271,22 +6516,79 @@
                   </a:ext>
                 </a:extLst>
               </a:tr>
-              <a:tr h="615704">
+            </a:tbl>
+          </a:graphicData>
+        </a:graphic>
+      </p:graphicFrame>
+      <p:graphicFrame>
+        <p:nvGraphicFramePr>
+          <p:cNvPr id="19" name="Table 18">
+            <a:extLst>
+              <a:ext uri="{FF2B5EF4-FFF2-40B4-BE49-F238E27FC236}">
+                <a16:creationId xmlns:a16="http://schemas.microsoft.com/office/drawing/2014/main" id="{B0FB4A7E-8753-4F06-860C-DD5CDA3BEF77}"/>
+              </a:ext>
+            </a:extLst>
+          </p:cNvPr>
+          <p:cNvGraphicFramePr>
+            <a:graphicFrameLocks noGrp="1"/>
+          </p:cNvGraphicFramePr>
+          <p:nvPr>
+            <p:extLst>
+              <p:ext uri="{D42A27DB-BD31-4B8C-83A1-F6EECF244321}">
+                <p14:modId xmlns:p14="http://schemas.microsoft.com/office/powerpoint/2010/main" val="3585864869"/>
+              </p:ext>
+            </p:extLst>
+          </p:nvPr>
+        </p:nvGraphicFramePr>
+        <p:xfrm>
+          <a:off x="4670869" y="4653135"/>
+          <a:ext cx="4121040" cy="1512167"/>
+        </p:xfrm>
+        <a:graphic>
+          <a:graphicData uri="http://schemas.openxmlformats.org/drawingml/2006/table">
+            <a:tbl>
+              <a:tblPr firstRow="1" bandRow="1">
+                <a:tableStyleId>{073A0DAA-6AF3-43AB-8588-CEC1D06C72B9}</a:tableStyleId>
+              </a:tblPr>
+              <a:tblGrid>
+                <a:gridCol w="1585014">
+                  <a:extLst>
+                    <a:ext uri="{9D8B030D-6E8A-4147-A177-3AD203B41FA5}">
+                      <a16:colId xmlns:a16="http://schemas.microsoft.com/office/drawing/2014/main" val="4077253036"/>
+                    </a:ext>
+                  </a:extLst>
+                </a:gridCol>
+                <a:gridCol w="1268012">
+                  <a:extLst>
+                    <a:ext uri="{9D8B030D-6E8A-4147-A177-3AD203B41FA5}">
+                      <a16:colId xmlns:a16="http://schemas.microsoft.com/office/drawing/2014/main" val="1373654776"/>
+                    </a:ext>
+                  </a:extLst>
+                </a:gridCol>
+                <a:gridCol w="1268014">
+                  <a:extLst>
+                    <a:ext uri="{9D8B030D-6E8A-4147-A177-3AD203B41FA5}">
+                      <a16:colId xmlns:a16="http://schemas.microsoft.com/office/drawing/2014/main" val="3982327588"/>
+                    </a:ext>
+                  </a:extLst>
+                </a:gridCol>
+              </a:tblGrid>
+              <a:tr h="811908">
                 <a:tc>
                   <a:txBody>
                     <a:bodyPr/>
                     <a:lstStyle/>
                     <a:p>
-                      <a:pPr latinLnBrk="1"/>
+                      <a:pPr algn="ctr" latinLnBrk="1">
+                        <a:lnSpc>
+                          <a:spcPct val="200000"/>
+                        </a:lnSpc>
+                      </a:pPr>
                       <a:r>
-                        <a:rPr lang="en-US" altLang="ko-KR" sz="1400" dirty="0" err="1"/>
-                        <a:t>DenseNet</a:t>
+                        <a:rPr lang="en-US" altLang="ko-KR" sz="1600" dirty="0"/>
+                        <a:t>Test</a:t>
                       </a:r>
-                      <a:r>
-                        <a:rPr lang="en-US" altLang="ko-KR" sz="1400" dirty="0"/>
-                        <a:t> with Augmentation</a:t>
-                      </a:r>
-                      <a:endParaRPr lang="ko-KR" altLang="en-US" sz="1400" dirty="0"/>
+                      <a:endParaRPr lang="ko-KR" altLang="en-US" sz="1600" dirty="0"/>
                     </a:p>
                   </a:txBody>
                   <a:tcPr/>
@@ -6296,12 +6598,19 @@
                     <a:bodyPr/>
                     <a:lstStyle/>
                     <a:p>
-                      <a:pPr latinLnBrk="1"/>
+                      <a:pPr algn="ctr" latinLnBrk="1"/>
                       <a:r>
-                        <a:rPr lang="en-US" altLang="ko-KR" sz="1400" dirty="0"/>
-                        <a:t>65.138</a:t>
+                        <a:rPr lang="en-US" altLang="ko-KR" sz="1600" dirty="0"/>
+                        <a:t>“Spelling”</a:t>
                       </a:r>
-                      <a:endParaRPr lang="ko-KR" altLang="en-US" sz="1400" dirty="0"/>
+                    </a:p>
+                    <a:p>
+                      <a:pPr algn="ctr" latinLnBrk="1"/>
+                      <a:r>
+                        <a:rPr lang="en-US" altLang="ko-KR" sz="1600" dirty="0"/>
+                        <a:t>Test set</a:t>
+                      </a:r>
+                      <a:endParaRPr lang="ko-KR" altLang="en-US" sz="1600" dirty="0"/>
                     </a:p>
                   </a:txBody>
                   <a:tcPr/>
@@ -6311,19 +6620,90 @@
                     <a:bodyPr/>
                     <a:lstStyle/>
                     <a:p>
-                      <a:pPr latinLnBrk="1"/>
+                      <a:pPr algn="ctr" latinLnBrk="1"/>
                       <a:r>
-                        <a:rPr lang="en-US" altLang="ko-KR" sz="1400" dirty="0"/>
-                        <a:t>4.739</a:t>
+                        <a:rPr lang="en-US" altLang="ko-KR" sz="1600" dirty="0"/>
+                        <a:t>“Kaggle”</a:t>
                       </a:r>
-                      <a:endParaRPr lang="ko-KR" altLang="en-US" sz="1400" dirty="0"/>
+                    </a:p>
+                    <a:p>
+                      <a:pPr algn="ctr" latinLnBrk="1"/>
+                      <a:r>
+                        <a:rPr lang="en-US" altLang="ko-KR" sz="1600" dirty="0"/>
+                        <a:t>Test set</a:t>
+                      </a:r>
+                      <a:endParaRPr lang="ko-KR" altLang="en-US" sz="1600" dirty="0"/>
                     </a:p>
                   </a:txBody>
                   <a:tcPr/>
                 </a:tc>
                 <a:extLst>
                   <a:ext uri="{0D108BD9-81ED-4DB2-BD59-A6C34878D82A}">
-                    <a16:rowId xmlns:a16="http://schemas.microsoft.com/office/drawing/2014/main" val="4040917903"/>
+                    <a16:rowId xmlns:a16="http://schemas.microsoft.com/office/drawing/2014/main" val="1092772788"/>
+                  </a:ext>
+                </a:extLst>
+              </a:tr>
+              <a:tr h="700259">
+                <a:tc>
+                  <a:txBody>
+                    <a:bodyPr/>
+                    <a:lstStyle/>
+                    <a:p>
+                      <a:pPr algn="ctr" latinLnBrk="1">
+                        <a:lnSpc>
+                          <a:spcPct val="200000"/>
+                        </a:lnSpc>
+                      </a:pPr>
+                      <a:r>
+                        <a:rPr lang="en-US" altLang="ko-KR" sz="1600" dirty="0"/>
+                        <a:t>accuracy</a:t>
+                      </a:r>
+                      <a:endParaRPr lang="ko-KR" altLang="en-US" sz="1600" dirty="0"/>
+                    </a:p>
+                  </a:txBody>
+                  <a:tcPr/>
+                </a:tc>
+                <a:tc>
+                  <a:txBody>
+                    <a:bodyPr/>
+                    <a:lstStyle/>
+                    <a:p>
+                      <a:pPr algn="ctr" latinLnBrk="1">
+                        <a:lnSpc>
+                          <a:spcPct val="200000"/>
+                        </a:lnSpc>
+                      </a:pPr>
+                      <a:r>
+                        <a:rPr lang="en-US" altLang="ko-KR" sz="1600" dirty="0"/>
+                        <a:t>65.138</a:t>
+                      </a:r>
+                      <a:endParaRPr lang="ko-KR" altLang="en-US" sz="1600" dirty="0"/>
+                    </a:p>
+                  </a:txBody>
+                  <a:tcPr/>
+                </a:tc>
+                <a:tc>
+                  <a:txBody>
+                    <a:bodyPr/>
+                    <a:lstStyle/>
+                    <a:p>
+                      <a:pPr algn="ctr" latinLnBrk="1">
+                        <a:lnSpc>
+                          <a:spcPct val="200000"/>
+                        </a:lnSpc>
+                      </a:pPr>
+                      <a:r>
+                        <a:rPr lang="en-US" altLang="ko-KR" sz="1600" dirty="0"/>
+                        <a:t>4.794</a:t>
+                      </a:r>
+                      <a:endParaRPr lang="ko-KR" altLang="en-US" sz="1600" dirty="0"/>
+                    </a:p>
+                  </a:txBody>
+                  <a:tcPr/>
+                </a:tc>
+                <a:extLst>
+                  <a:ext uri="{0D108BD9-81ED-4DB2-BD59-A6C34878D82A}">
+                    <a16:rowId xmlns:a16="http://schemas.microsoft.com/office/drawing/2014/main" val="140994672"/>
                   </a:ext>
                 </a:extLst>
               </a:tr>
@@ -6331,198 +6711,6 @@
           </a:graphicData>
         </a:graphic>
       </p:graphicFrame>
-      <p:sp>
-        <p:nvSpPr>
-          <p:cNvPr id="13" name="TextBox 12">
-            <a:extLst>
-              <a:ext uri="{FF2B5EF4-FFF2-40B4-BE49-F238E27FC236}">
-                <a16:creationId xmlns:a16="http://schemas.microsoft.com/office/drawing/2014/main" id="{97D351AC-9845-4FF6-A723-2DFEAB643A95}"/>
-              </a:ext>
-            </a:extLst>
-          </p:cNvPr>
-          <p:cNvSpPr txBox="1"/>
-          <p:nvPr/>
-        </p:nvSpPr>
-        <p:spPr>
-          <a:xfrm>
-            <a:off x="179512" y="1556792"/>
-            <a:ext cx="6408712" cy="461665"/>
-          </a:xfrm>
-          <a:prstGeom prst="rect">
-            <a:avLst/>
-          </a:prstGeom>
-          <a:noFill/>
-        </p:spPr>
-        <p:txBody>
-          <a:bodyPr wrap="square" rtlCol="0">
-            <a:spAutoFit/>
-          </a:bodyPr>
-          <a:lstStyle/>
-          <a:p>
-            <a:r>
-              <a:rPr lang="en-US" altLang="ko-KR" dirty="0"/>
-              <a:t>Training for two different settings</a:t>
-            </a:r>
-            <a:endParaRPr lang="ko-KR" altLang="en-US" dirty="0"/>
-          </a:p>
-        </p:txBody>
-      </p:sp>
-      <p:sp>
-        <p:nvSpPr>
-          <p:cNvPr id="14" name="TextBox 13">
-            <a:extLst>
-              <a:ext uri="{FF2B5EF4-FFF2-40B4-BE49-F238E27FC236}">
-                <a16:creationId xmlns:a16="http://schemas.microsoft.com/office/drawing/2014/main" id="{982F87F7-FB09-449B-82A0-02D84AA323A6}"/>
-              </a:ext>
-            </a:extLst>
-          </p:cNvPr>
-          <p:cNvSpPr txBox="1"/>
-          <p:nvPr/>
-        </p:nvSpPr>
-        <p:spPr>
-          <a:xfrm>
-            <a:off x="179512" y="3903439"/>
-            <a:ext cx="6408712" cy="461665"/>
-          </a:xfrm>
-          <a:prstGeom prst="rect">
-            <a:avLst/>
-          </a:prstGeom>
-          <a:noFill/>
-        </p:spPr>
-        <p:txBody>
-          <a:bodyPr wrap="square" rtlCol="0">
-            <a:spAutoFit/>
-          </a:bodyPr>
-          <a:lstStyle/>
-          <a:p>
-            <a:r>
-              <a:rPr lang="en-US" altLang="ko-KR" dirty="0"/>
-              <a:t>Test accuracy for two different test sets</a:t>
-            </a:r>
-            <a:endParaRPr lang="ko-KR" altLang="en-US" dirty="0"/>
-          </a:p>
-        </p:txBody>
-      </p:sp>
-      <p:pic>
-        <p:nvPicPr>
-          <p:cNvPr id="12" name="Picture 11">
-            <a:extLst>
-              <a:ext uri="{FF2B5EF4-FFF2-40B4-BE49-F238E27FC236}">
-                <a16:creationId xmlns:a16="http://schemas.microsoft.com/office/drawing/2014/main" id="{54879ADA-6299-49B9-93D1-9FFC60B27316}"/>
-              </a:ext>
-            </a:extLst>
-          </p:cNvPr>
-          <p:cNvPicPr>
-            <a:picLocks noChangeAspect="1"/>
-          </p:cNvPicPr>
-          <p:nvPr/>
-        </p:nvPicPr>
-        <p:blipFill>
-          <a:blip r:embed="rId2"/>
-          <a:stretch>
-            <a:fillRect/>
-          </a:stretch>
-        </p:blipFill>
-        <p:spPr>
-          <a:xfrm>
-            <a:off x="156802" y="2336501"/>
-            <a:ext cx="4334927" cy="2709390"/>
-          </a:xfrm>
-          <a:prstGeom prst="rect">
-            <a:avLst/>
-          </a:prstGeom>
-        </p:spPr>
-      </p:pic>
-      <p:pic>
-        <p:nvPicPr>
-          <p:cNvPr id="10" name="Picture 9">
-            <a:extLst>
-              <a:ext uri="{FF2B5EF4-FFF2-40B4-BE49-F238E27FC236}">
-                <a16:creationId xmlns:a16="http://schemas.microsoft.com/office/drawing/2014/main" id="{A40DB47E-261E-49BB-A35E-13BA293AF04F}"/>
-              </a:ext>
-            </a:extLst>
-          </p:cNvPr>
-          <p:cNvPicPr>
-            <a:picLocks noChangeAspect="1"/>
-          </p:cNvPicPr>
-          <p:nvPr/>
-        </p:nvPicPr>
-        <p:blipFill>
-          <a:blip r:embed="rId3"/>
-          <a:stretch>
-            <a:fillRect/>
-          </a:stretch>
-        </p:blipFill>
-        <p:spPr>
-          <a:xfrm>
-            <a:off x="4621236" y="2354051"/>
-            <a:ext cx="4389798" cy="2674289"/>
-          </a:xfrm>
-          <a:prstGeom prst="rect">
-            <a:avLst/>
-          </a:prstGeom>
-        </p:spPr>
-      </p:pic>
-      <p:pic>
-        <p:nvPicPr>
-          <p:cNvPr id="3" name="Picture 2">
-            <a:extLst>
-              <a:ext uri="{FF2B5EF4-FFF2-40B4-BE49-F238E27FC236}">
-                <a16:creationId xmlns:a16="http://schemas.microsoft.com/office/drawing/2014/main" id="{E776407C-A133-442E-B73E-5587CF93BA75}"/>
-              </a:ext>
-            </a:extLst>
-          </p:cNvPr>
-          <p:cNvPicPr>
-            <a:picLocks noChangeAspect="1"/>
-          </p:cNvPicPr>
-          <p:nvPr/>
-        </p:nvPicPr>
-        <p:blipFill>
-          <a:blip r:embed="rId4"/>
-          <a:stretch>
-            <a:fillRect/>
-          </a:stretch>
-        </p:blipFill>
-        <p:spPr>
-          <a:xfrm>
-            <a:off x="4621236" y="2337265"/>
-            <a:ext cx="4312217" cy="2857242"/>
-          </a:xfrm>
-          <a:prstGeom prst="rect">
-            <a:avLst/>
-          </a:prstGeom>
-        </p:spPr>
-      </p:pic>
-      <p:pic>
-        <p:nvPicPr>
-          <p:cNvPr id="7" name="Picture 6">
-            <a:extLst>
-              <a:ext uri="{FF2B5EF4-FFF2-40B4-BE49-F238E27FC236}">
-                <a16:creationId xmlns:a16="http://schemas.microsoft.com/office/drawing/2014/main" id="{FD31E24D-72F0-4CD1-A0EE-2D371DA42C4B}"/>
-              </a:ext>
-            </a:extLst>
-          </p:cNvPr>
-          <p:cNvPicPr>
-            <a:picLocks noChangeAspect="1"/>
-          </p:cNvPicPr>
-          <p:nvPr/>
-        </p:nvPicPr>
-        <p:blipFill>
-          <a:blip r:embed="rId5"/>
-          <a:stretch>
-            <a:fillRect/>
-          </a:stretch>
-        </p:blipFill>
-        <p:spPr>
-          <a:xfrm>
-            <a:off x="156802" y="2318695"/>
-            <a:ext cx="4375683" cy="2862469"/>
-          </a:xfrm>
-          <a:prstGeom prst="rect">
-            <a:avLst/>
-          </a:prstGeom>
-        </p:spPr>
-      </p:pic>
     </p:spTree>
     <p:extLst>
       <p:ext uri="{BB962C8B-B14F-4D97-AF65-F5344CB8AC3E}">
@@ -6533,428 +6721,6 @@
   <p:clrMapOvr>
     <a:masterClrMapping/>
   </p:clrMapOvr>
-  <p:timing>
-    <p:tnLst>
-      <p:par>
-        <p:cTn id="1" dur="indefinite" restart="never" nodeType="tmRoot">
-          <p:childTnLst>
-            <p:seq concurrent="1" nextAc="seek">
-              <p:cTn id="2" dur="indefinite" nodeType="mainSeq">
-                <p:childTnLst>
-                  <p:par>
-                    <p:cTn id="3" fill="hold">
-                      <p:stCondLst>
-                        <p:cond delay="indefinite"/>
-                      </p:stCondLst>
-                      <p:childTnLst>
-                        <p:par>
-                          <p:cTn id="4" fill="hold">
-                            <p:stCondLst>
-                              <p:cond delay="0"/>
-                            </p:stCondLst>
-                            <p:childTnLst>
-                              <p:par>
-                                <p:cTn id="5" presetID="1" presetClass="entr" presetSubtype="0" fill="hold" nodeType="clickEffect">
-                                  <p:stCondLst>
-                                    <p:cond delay="0"/>
-                                  </p:stCondLst>
-                                  <p:childTnLst>
-                                    <p:set>
-                                      <p:cBhvr>
-                                        <p:cTn id="6" dur="1" fill="hold">
-                                          <p:stCondLst>
-                                            <p:cond delay="0"/>
-                                          </p:stCondLst>
-                                        </p:cTn>
-                                        <p:tgtEl>
-                                          <p:spTgt spid="12"/>
-                                        </p:tgtEl>
-                                        <p:attrNameLst>
-                                          <p:attrName>style.visibility</p:attrName>
-                                        </p:attrNameLst>
-                                      </p:cBhvr>
-                                      <p:to>
-                                        <p:strVal val="visible"/>
-                                      </p:to>
-                                    </p:set>
-                                  </p:childTnLst>
-                                </p:cTn>
-                              </p:par>
-                            </p:childTnLst>
-                          </p:cTn>
-                        </p:par>
-                      </p:childTnLst>
-                    </p:cTn>
-                  </p:par>
-                  <p:par>
-                    <p:cTn id="7" fill="hold">
-                      <p:stCondLst>
-                        <p:cond delay="indefinite"/>
-                      </p:stCondLst>
-                      <p:childTnLst>
-                        <p:par>
-                          <p:cTn id="8" fill="hold">
-                            <p:stCondLst>
-                              <p:cond delay="0"/>
-                            </p:stCondLst>
-                            <p:childTnLst>
-                              <p:par>
-                                <p:cTn id="9" presetID="1" presetClass="entr" presetSubtype="0" fill="hold" nodeType="clickEffect">
-                                  <p:stCondLst>
-                                    <p:cond delay="0"/>
-                                  </p:stCondLst>
-                                  <p:childTnLst>
-                                    <p:set>
-                                      <p:cBhvr>
-                                        <p:cTn id="10" dur="1" fill="hold">
-                                          <p:stCondLst>
-                                            <p:cond delay="0"/>
-                                          </p:stCondLst>
-                                        </p:cTn>
-                                        <p:tgtEl>
-                                          <p:spTgt spid="10"/>
-                                        </p:tgtEl>
-                                        <p:attrNameLst>
-                                          <p:attrName>style.visibility</p:attrName>
-                                        </p:attrNameLst>
-                                      </p:cBhvr>
-                                      <p:to>
-                                        <p:strVal val="visible"/>
-                                      </p:to>
-                                    </p:set>
-                                  </p:childTnLst>
-                                </p:cTn>
-                              </p:par>
-                            </p:childTnLst>
-                          </p:cTn>
-                        </p:par>
-                      </p:childTnLst>
-                    </p:cTn>
-                  </p:par>
-                  <p:par>
-                    <p:cTn id="11" fill="hold">
-                      <p:stCondLst>
-                        <p:cond delay="indefinite"/>
-                      </p:stCondLst>
-                      <p:childTnLst>
-                        <p:par>
-                          <p:cTn id="12" fill="hold">
-                            <p:stCondLst>
-                              <p:cond delay="0"/>
-                            </p:stCondLst>
-                            <p:childTnLst>
-                              <p:par>
-                                <p:cTn id="13" presetID="10" presetClass="exit" presetSubtype="0" fill="hold" nodeType="clickEffect">
-                                  <p:stCondLst>
-                                    <p:cond delay="0"/>
-                                  </p:stCondLst>
-                                  <p:childTnLst>
-                                    <p:animEffect transition="out" filter="fade">
-                                      <p:cBhvr>
-                                        <p:cTn id="14" dur="500"/>
-                                        <p:tgtEl>
-                                          <p:spTgt spid="12"/>
-                                        </p:tgtEl>
-                                      </p:cBhvr>
-                                    </p:animEffect>
-                                    <p:set>
-                                      <p:cBhvr>
-                                        <p:cTn id="15" dur="1" fill="hold">
-                                          <p:stCondLst>
-                                            <p:cond delay="499"/>
-                                          </p:stCondLst>
-                                        </p:cTn>
-                                        <p:tgtEl>
-                                          <p:spTgt spid="12"/>
-                                        </p:tgtEl>
-                                        <p:attrNameLst>
-                                          <p:attrName>style.visibility</p:attrName>
-                                        </p:attrNameLst>
-                                      </p:cBhvr>
-                                      <p:to>
-                                        <p:strVal val="hidden"/>
-                                      </p:to>
-                                    </p:set>
-                                  </p:childTnLst>
-                                </p:cTn>
-                              </p:par>
-                            </p:childTnLst>
-                          </p:cTn>
-                        </p:par>
-                      </p:childTnLst>
-                    </p:cTn>
-                  </p:par>
-                  <p:par>
-                    <p:cTn id="16" fill="hold">
-                      <p:stCondLst>
-                        <p:cond delay="indefinite"/>
-                      </p:stCondLst>
-                      <p:childTnLst>
-                        <p:par>
-                          <p:cTn id="17" fill="hold">
-                            <p:stCondLst>
-                              <p:cond delay="0"/>
-                            </p:stCondLst>
-                            <p:childTnLst>
-                              <p:par>
-                                <p:cTn id="18" presetID="10" presetClass="exit" presetSubtype="0" fill="hold" nodeType="clickEffect">
-                                  <p:stCondLst>
-                                    <p:cond delay="0"/>
-                                  </p:stCondLst>
-                                  <p:childTnLst>
-                                    <p:animEffect transition="out" filter="fade">
-                                      <p:cBhvr>
-                                        <p:cTn id="19" dur="500"/>
-                                        <p:tgtEl>
-                                          <p:spTgt spid="10"/>
-                                        </p:tgtEl>
-                                      </p:cBhvr>
-                                    </p:animEffect>
-                                    <p:set>
-                                      <p:cBhvr>
-                                        <p:cTn id="20" dur="1" fill="hold">
-                                          <p:stCondLst>
-                                            <p:cond delay="499"/>
-                                          </p:stCondLst>
-                                        </p:cTn>
-                                        <p:tgtEl>
-                                          <p:spTgt spid="10"/>
-                                        </p:tgtEl>
-                                        <p:attrNameLst>
-                                          <p:attrName>style.visibility</p:attrName>
-                                        </p:attrNameLst>
-                                      </p:cBhvr>
-                                      <p:to>
-                                        <p:strVal val="hidden"/>
-                                      </p:to>
-                                    </p:set>
-                                  </p:childTnLst>
-                                </p:cTn>
-                              </p:par>
-                            </p:childTnLst>
-                          </p:cTn>
-                        </p:par>
-                      </p:childTnLst>
-                    </p:cTn>
-                  </p:par>
-                  <p:par>
-                    <p:cTn id="21" fill="hold">
-                      <p:stCondLst>
-                        <p:cond delay="indefinite"/>
-                      </p:stCondLst>
-                      <p:childTnLst>
-                        <p:par>
-                          <p:cTn id="22" fill="hold">
-                            <p:stCondLst>
-                              <p:cond delay="0"/>
-                            </p:stCondLst>
-                            <p:childTnLst>
-                              <p:par>
-                                <p:cTn id="23" presetID="1" presetClass="entr" presetSubtype="0" fill="hold" nodeType="clickEffect">
-                                  <p:stCondLst>
-                                    <p:cond delay="0"/>
-                                  </p:stCondLst>
-                                  <p:childTnLst>
-                                    <p:set>
-                                      <p:cBhvr>
-                                        <p:cTn id="24" dur="1" fill="hold">
-                                          <p:stCondLst>
-                                            <p:cond delay="0"/>
-                                          </p:stCondLst>
-                                        </p:cTn>
-                                        <p:tgtEl>
-                                          <p:spTgt spid="7"/>
-                                        </p:tgtEl>
-                                        <p:attrNameLst>
-                                          <p:attrName>style.visibility</p:attrName>
-                                        </p:attrNameLst>
-                                      </p:cBhvr>
-                                      <p:to>
-                                        <p:strVal val="visible"/>
-                                      </p:to>
-                                    </p:set>
-                                  </p:childTnLst>
-                                </p:cTn>
-                              </p:par>
-                            </p:childTnLst>
-                          </p:cTn>
-                        </p:par>
-                      </p:childTnLst>
-                    </p:cTn>
-                  </p:par>
-                  <p:par>
-                    <p:cTn id="25" fill="hold">
-                      <p:stCondLst>
-                        <p:cond delay="indefinite"/>
-                      </p:stCondLst>
-                      <p:childTnLst>
-                        <p:par>
-                          <p:cTn id="26" fill="hold">
-                            <p:stCondLst>
-                              <p:cond delay="0"/>
-                            </p:stCondLst>
-                            <p:childTnLst>
-                              <p:par>
-                                <p:cTn id="27" presetID="1" presetClass="entr" presetSubtype="0" fill="hold" nodeType="clickEffect">
-                                  <p:stCondLst>
-                                    <p:cond delay="0"/>
-                                  </p:stCondLst>
-                                  <p:childTnLst>
-                                    <p:set>
-                                      <p:cBhvr>
-                                        <p:cTn id="28" dur="1" fill="hold">
-                                          <p:stCondLst>
-                                            <p:cond delay="0"/>
-                                          </p:stCondLst>
-                                        </p:cTn>
-                                        <p:tgtEl>
-                                          <p:spTgt spid="3"/>
-                                        </p:tgtEl>
-                                        <p:attrNameLst>
-                                          <p:attrName>style.visibility</p:attrName>
-                                        </p:attrNameLst>
-                                      </p:cBhvr>
-                                      <p:to>
-                                        <p:strVal val="visible"/>
-                                      </p:to>
-                                    </p:set>
-                                  </p:childTnLst>
-                                </p:cTn>
-                              </p:par>
-                            </p:childTnLst>
-                          </p:cTn>
-                        </p:par>
-                      </p:childTnLst>
-                    </p:cTn>
-                  </p:par>
-                  <p:par>
-                    <p:cTn id="29" fill="hold">
-                      <p:stCondLst>
-                        <p:cond delay="indefinite"/>
-                      </p:stCondLst>
-                      <p:childTnLst>
-                        <p:par>
-                          <p:cTn id="30" fill="hold">
-                            <p:stCondLst>
-                              <p:cond delay="0"/>
-                            </p:stCondLst>
-                            <p:childTnLst>
-                              <p:par>
-                                <p:cTn id="31" presetID="10" presetClass="exit" presetSubtype="0" fill="hold" nodeType="clickEffect">
-                                  <p:stCondLst>
-                                    <p:cond delay="0"/>
-                                  </p:stCondLst>
-                                  <p:childTnLst>
-                                    <p:animEffect transition="out" filter="fade">
-                                      <p:cBhvr>
-                                        <p:cTn id="32" dur="500"/>
-                                        <p:tgtEl>
-                                          <p:spTgt spid="7"/>
-                                        </p:tgtEl>
-                                      </p:cBhvr>
-                                    </p:animEffect>
-                                    <p:set>
-                                      <p:cBhvr>
-                                        <p:cTn id="33" dur="1" fill="hold">
-                                          <p:stCondLst>
-                                            <p:cond delay="499"/>
-                                          </p:stCondLst>
-                                        </p:cTn>
-                                        <p:tgtEl>
-                                          <p:spTgt spid="7"/>
-                                        </p:tgtEl>
-                                        <p:attrNameLst>
-                                          <p:attrName>style.visibility</p:attrName>
-                                        </p:attrNameLst>
-                                      </p:cBhvr>
-                                      <p:to>
-                                        <p:strVal val="hidden"/>
-                                      </p:to>
-                                    </p:set>
-                                  </p:childTnLst>
-                                </p:cTn>
-                              </p:par>
-                            </p:childTnLst>
-                          </p:cTn>
-                        </p:par>
-                      </p:childTnLst>
-                    </p:cTn>
-                  </p:par>
-                  <p:par>
-                    <p:cTn id="34" fill="hold">
-                      <p:stCondLst>
-                        <p:cond delay="indefinite"/>
-                      </p:stCondLst>
-                      <p:childTnLst>
-                        <p:par>
-                          <p:cTn id="35" fill="hold">
-                            <p:stCondLst>
-                              <p:cond delay="0"/>
-                            </p:stCondLst>
-                            <p:childTnLst>
-                              <p:par>
-                                <p:cTn id="36" presetID="10" presetClass="exit" presetSubtype="0" fill="hold" nodeType="clickEffect">
-                                  <p:stCondLst>
-                                    <p:cond delay="0"/>
-                                  </p:stCondLst>
-                                  <p:childTnLst>
-                                    <p:animEffect transition="out" filter="fade">
-                                      <p:cBhvr>
-                                        <p:cTn id="37" dur="500"/>
-                                        <p:tgtEl>
-                                          <p:spTgt spid="3"/>
-                                        </p:tgtEl>
-                                      </p:cBhvr>
-                                    </p:animEffect>
-                                    <p:set>
-                                      <p:cBhvr>
-                                        <p:cTn id="38" dur="1" fill="hold">
-                                          <p:stCondLst>
-                                            <p:cond delay="499"/>
-                                          </p:stCondLst>
-                                        </p:cTn>
-                                        <p:tgtEl>
-                                          <p:spTgt spid="3"/>
-                                        </p:tgtEl>
-                                        <p:attrNameLst>
-                                          <p:attrName>style.visibility</p:attrName>
-                                        </p:attrNameLst>
-                                      </p:cBhvr>
-                                      <p:to>
-                                        <p:strVal val="hidden"/>
-                                      </p:to>
-                                    </p:set>
-                                  </p:childTnLst>
-                                </p:cTn>
-                              </p:par>
-                            </p:childTnLst>
-                          </p:cTn>
-                        </p:par>
-                      </p:childTnLst>
-                    </p:cTn>
-                  </p:par>
-                </p:childTnLst>
-              </p:cTn>
-              <p:prevCondLst>
-                <p:cond evt="onPrev" delay="0">
-                  <p:tgtEl>
-                    <p:sldTgt/>
-                  </p:tgtEl>
-                </p:cond>
-              </p:prevCondLst>
-              <p:nextCondLst>
-                <p:cond evt="onNext" delay="0">
-                  <p:tgtEl>
-                    <p:sldTgt/>
-                  </p:tgtEl>
-                </p:cond>
-              </p:nextCondLst>
-            </p:seq>
-          </p:childTnLst>
-        </p:cTn>
-      </p:par>
-    </p:tnLst>
-  </p:timing>
 </p:sld>
 </file>
 

</xml_diff>

<commit_message>
Added conclusions to slides
</commit_message>
<xml_diff>
--- a/ATML_presentation.pptx
+++ b/ATML_presentation.pptx
@@ -469,7 +469,7 @@
             <a:fld id="{CF110CB4-791D-4D73-82DE-F3300A775DAD}" type="slidenum">
               <a:rPr lang="de-CH"/>
               <a:pPr/>
-              <a:t>‹#›</a:t>
+              <a:t>‹Nr.›</a:t>
             </a:fld>
             <a:endParaRPr lang="de-CH"/>
           </a:p>
@@ -922,7 +922,7 @@
             <a:fld id="{04A51B89-CABC-45B5-B711-980681E2ED72}" type="slidenum">
               <a:rPr lang="de-CH"/>
               <a:pPr/>
-              <a:t>‹#›</a:t>
+              <a:t>‹Nr.›</a:t>
             </a:fld>
             <a:endParaRPr lang="de-CH"/>
           </a:p>
@@ -1588,7 +1588,7 @@
             <a:fld id="{0FA23137-8AB5-492B-A26F-2C7E38032BB6}" type="slidenum">
               <a:rPr lang="de-CH"/>
               <a:pPr/>
-              <a:t>‹#›</a:t>
+              <a:t>‹Nr.›</a:t>
             </a:fld>
             <a:endParaRPr lang="de-CH"/>
           </a:p>
@@ -1815,7 +1815,7 @@
             <a:fld id="{A7C979AF-FB10-41AA-A0F7-7145D14321FF}" type="slidenum">
               <a:rPr lang="de-CH"/>
               <a:pPr/>
-              <a:t>‹#›</a:t>
+              <a:t>‹Nr.›</a:t>
             </a:fld>
             <a:endParaRPr lang="de-CH"/>
           </a:p>
@@ -2016,7 +2016,7 @@
             <a:fld id="{84311057-1CF0-4B56-8E39-F4D8C0B74A6E}" type="slidenum">
               <a:rPr lang="de-CH"/>
               <a:pPr/>
-              <a:t>‹#›</a:t>
+              <a:t>‹Nr.›</a:t>
             </a:fld>
             <a:endParaRPr lang="de-CH"/>
           </a:p>
@@ -2207,7 +2207,7 @@
             <a:fld id="{3D6ED8A1-37C3-4579-98E8-A9E8D86396A5}" type="slidenum">
               <a:rPr lang="de-CH"/>
               <a:pPr/>
-              <a:t>‹#›</a:t>
+              <a:t>‹Nr.›</a:t>
             </a:fld>
             <a:endParaRPr lang="de-CH"/>
           </a:p>
@@ -2420,7 +2420,7 @@
             <a:fld id="{A42C61A4-63F0-4A9B-BC7E-5956E1A009F3}" type="slidenum">
               <a:rPr lang="de-CH"/>
               <a:pPr/>
-              <a:t>‹#›</a:t>
+              <a:t>‹Nr.›</a:t>
             </a:fld>
             <a:endParaRPr lang="de-CH"/>
           </a:p>
@@ -2729,7 +2729,7 @@
             <a:fld id="{576385C3-62BC-4687-8A3A-C6CD0FEED2F0}" type="slidenum">
               <a:rPr lang="de-CH"/>
               <a:pPr/>
-              <a:t>‹#›</a:t>
+              <a:t>‹Nr.›</a:t>
             </a:fld>
             <a:endParaRPr lang="de-CH"/>
           </a:p>
@@ -3177,7 +3177,7 @@
             <a:fld id="{A0118724-4A6D-4D4F-8086-F1584E08094B}" type="slidenum">
               <a:rPr lang="de-CH"/>
               <a:pPr/>
-              <a:t>‹#›</a:t>
+              <a:t>‹Nr.›</a:t>
             </a:fld>
             <a:endParaRPr lang="de-CH"/>
           </a:p>
@@ -3316,7 +3316,7 @@
             <a:fld id="{44991074-D27D-4C96-A136-2196CA043B12}" type="slidenum">
               <a:rPr lang="de-CH"/>
               <a:pPr/>
-              <a:t>‹#›</a:t>
+              <a:t>‹Nr.›</a:t>
             </a:fld>
             <a:endParaRPr lang="de-CH"/>
           </a:p>
@@ -3432,7 +3432,7 @@
             <a:fld id="{CFEC23FD-0CFB-49B2-87B0-BE605FE963F0}" type="slidenum">
               <a:rPr lang="de-CH"/>
               <a:pPr/>
-              <a:t>‹#›</a:t>
+              <a:t>‹Nr.›</a:t>
             </a:fld>
             <a:endParaRPr lang="de-CH"/>
           </a:p>
@@ -3730,7 +3730,7 @@
             <a:fld id="{502201E4-85BB-4B0E-BEB7-39EEB1DD783F}" type="slidenum">
               <a:rPr lang="de-CH"/>
               <a:pPr/>
-              <a:t>‹#›</a:t>
+              <a:t>‹Nr.›</a:t>
             </a:fld>
             <a:endParaRPr lang="de-CH"/>
           </a:p>
@@ -4008,7 +4008,7 @@
             <a:fld id="{75D519C1-6294-4B3A-9F72-D91BCFBC54C5}" type="slidenum">
               <a:rPr lang="de-CH"/>
               <a:pPr/>
-              <a:t>‹#›</a:t>
+              <a:t>‹Nr.›</a:t>
             </a:fld>
             <a:endParaRPr lang="de-CH"/>
           </a:p>
@@ -4542,7 +4542,7 @@
             <a:fld id="{31266581-0159-4A87-A1D2-ABFAB9B353D3}" type="slidenum">
               <a:rPr lang="de-CH"/>
               <a:pPr/>
-              <a:t>‹#›</a:t>
+              <a:t>‹Nr.›</a:t>
             </a:fld>
             <a:endParaRPr lang="de-CH"/>
           </a:p>
@@ -6786,12 +6786,63 @@
             <p:ph idx="1"/>
           </p:nvPr>
         </p:nvSpPr>
-        <p:spPr/>
+        <p:spPr>
+          <a:xfrm>
+            <a:off x="539750" y="2564904"/>
+            <a:ext cx="8061325" cy="3588246"/>
+          </a:xfrm>
+        </p:spPr>
         <p:txBody>
           <a:bodyPr/>
           <a:lstStyle/>
           <a:p>
-            <a:endParaRPr lang="ko-KR" altLang="en-US"/>
+            <a:r>
+              <a:rPr lang="en-US" altLang="ko-KR" dirty="0"/>
+              <a:t>Generalization is hard for this task</a:t>
+            </a:r>
+          </a:p>
+          <a:p>
+            <a:r>
+              <a:rPr lang="en-US" altLang="ko-KR" dirty="0"/>
+              <a:t>Further work would allow to look at interesting </a:t>
+            </a:r>
+            <a:r>
+              <a:rPr lang="en-US" altLang="ko-KR" dirty="0" err="1"/>
+              <a:t>behaviour</a:t>
+            </a:r>
+            <a:r>
+              <a:rPr lang="en-US" altLang="ko-KR" dirty="0"/>
+              <a:t>:</a:t>
+            </a:r>
+          </a:p>
+          <a:p>
+            <a:pPr lvl="1"/>
+            <a:r>
+              <a:rPr lang="en-US" altLang="ko-KR" dirty="0"/>
+              <a:t>Validation vs. Training accuracy for Data augmentation</a:t>
+            </a:r>
+          </a:p>
+          <a:p>
+            <a:pPr lvl="1"/>
+            <a:r>
+              <a:rPr lang="en-US" altLang="ko-KR" dirty="0"/>
+              <a:t>Get better understanding of exact differences between datasets</a:t>
+            </a:r>
+          </a:p>
+          <a:p>
+            <a:pPr lvl="1"/>
+            <a:r>
+              <a:rPr lang="en-US" altLang="ko-KR" dirty="0"/>
+              <a:t>Trying out more efficient implementations of </a:t>
+            </a:r>
+            <a:r>
+              <a:rPr lang="en-US" altLang="ko-KR" dirty="0" err="1"/>
+              <a:t>DenseNet</a:t>
+            </a:r>
+            <a:endParaRPr lang="en-US" altLang="ko-KR" dirty="0"/>
+          </a:p>
+          <a:p>
+            <a:endParaRPr lang="ko-KR" altLang="en-US" dirty="0"/>
           </a:p>
         </p:txBody>
       </p:sp>

</xml_diff>

<commit_message>
Removed the comment about memory usage
</commit_message>
<xml_diff>
--- a/ATML_presentation.pptx
+++ b/ATML_presentation.pptx
@@ -10074,15 +10074,7 @@
             </a:br>
             <a:r>
               <a:rPr lang="en-US" altLang="ko-KR" dirty="0"/>
-              <a:t>Mini-batch size of 32 ( </a:t>
-            </a:r>
-            <a:r>
-              <a:rPr lang="en-US" altLang="ko-KR" dirty="0" err="1"/>
-              <a:t>DenseNet</a:t>
-            </a:r>
-            <a:r>
-              <a:rPr lang="en-US" altLang="ko-KR" dirty="0"/>
-              <a:t> is Memory hungry)</a:t>
+              <a:t>Mini-batch size of 32</a:t>
             </a:r>
           </a:p>
           <a:p>

</xml_diff>